<commit_message>
Work on Gestalt in data-viz-03.
</commit_message>
<xml_diff>
--- a/data-viz-03/component/recommendations-gestalt.pptx
+++ b/data-viz-03/component/recommendations-gestalt.pptx
@@ -878,6 +878,744 @@
             </a:pPr>
             <a:r>
               <a:rPr/>
+              <a:t>Notice</a:t>
+            </a:r>
+            <a:r>
+              <a:rPr/>
+              <a:t> </a:t>
+            </a:r>
+            <a:r>
+              <a:rPr/>
+              <a:t>how</a:t>
+            </a:r>
+            <a:r>
+              <a:rPr/>
+              <a:t> </a:t>
+            </a:r>
+            <a:r>
+              <a:rPr/>
+              <a:t>the</a:t>
+            </a:r>
+            <a:r>
+              <a:rPr/>
+              <a:t> </a:t>
+            </a:r>
+            <a:r>
+              <a:rPr/>
+              <a:t>labels</a:t>
+            </a:r>
+            <a:r>
+              <a:rPr/>
+              <a:t> </a:t>
+            </a:r>
+            <a:r>
+              <a:rPr/>
+              <a:t>in</a:t>
+            </a:r>
+            <a:r>
+              <a:rPr/>
+              <a:t> </a:t>
+            </a:r>
+            <a:r>
+              <a:rPr/>
+              <a:t>this</a:t>
+            </a:r>
+            <a:r>
+              <a:rPr/>
+              <a:t> </a:t>
+            </a:r>
+            <a:r>
+              <a:rPr/>
+              <a:t>example</a:t>
+            </a:r>
+            <a:r>
+              <a:rPr/>
+              <a:t> </a:t>
+            </a:r>
+            <a:r>
+              <a:rPr/>
+              <a:t>have</a:t>
+            </a:r>
+            <a:r>
+              <a:rPr/>
+              <a:t> </a:t>
+            </a:r>
+            <a:r>
+              <a:rPr/>
+              <a:t>been</a:t>
+            </a:r>
+            <a:r>
+              <a:rPr/>
+              <a:t> </a:t>
+            </a:r>
+            <a:r>
+              <a:rPr/>
+              <a:t>moved</a:t>
+            </a:r>
+            <a:r>
+              <a:rPr/>
+              <a:t> </a:t>
+            </a:r>
+            <a:r>
+              <a:rPr/>
+              <a:t>closer</a:t>
+            </a:r>
+            <a:r>
+              <a:rPr/>
+              <a:t> </a:t>
+            </a:r>
+            <a:r>
+              <a:rPr/>
+              <a:t>to</a:t>
+            </a:r>
+            <a:r>
+              <a:rPr/>
+              <a:t> </a:t>
+            </a:r>
+            <a:r>
+              <a:rPr/>
+              <a:t>the</a:t>
+            </a:r>
+            <a:r>
+              <a:rPr/>
+              <a:t> </a:t>
+            </a:r>
+            <a:r>
+              <a:rPr/>
+              <a:t>lines.</a:t>
+            </a:r>
+            <a:r>
+              <a:rPr/>
+              <a:t> </a:t>
+            </a:r>
+            <a:r>
+              <a:rPr/>
+              <a:t>The</a:t>
+            </a:r>
+            <a:r>
+              <a:rPr/>
+              <a:t> </a:t>
+            </a:r>
+            <a:r>
+              <a:rPr/>
+              <a:t>exploits</a:t>
+            </a:r>
+            <a:r>
+              <a:rPr/>
+              <a:t> </a:t>
+            </a:r>
+            <a:r>
+              <a:rPr/>
+              <a:t>the</a:t>
+            </a:r>
+            <a:r>
+              <a:rPr/>
+              <a:t> </a:t>
+            </a:r>
+            <a:r>
+              <a:rPr/>
+              <a:t>Gestalt</a:t>
+            </a:r>
+            <a:r>
+              <a:rPr/>
+              <a:t> </a:t>
+            </a:r>
+            <a:r>
+              <a:rPr/>
+              <a:t>principle</a:t>
+            </a:r>
+            <a:r>
+              <a:rPr/>
+              <a:t> </a:t>
+            </a:r>
+            <a:r>
+              <a:rPr/>
+              <a:t>of</a:t>
+            </a:r>
+            <a:r>
+              <a:rPr/>
+              <a:t> </a:t>
+            </a:r>
+            <a:r>
+              <a:rPr/>
+              <a:t>proximity.</a:t>
+            </a:r>
+            <a:r>
+              <a:rPr/>
+              <a:t> </a:t>
+            </a:r>
+            <a:r>
+              <a:rPr/>
+              <a:t>Notice</a:t>
+            </a:r>
+            <a:r>
+              <a:rPr/>
+              <a:t> </a:t>
+            </a:r>
+            <a:r>
+              <a:rPr/>
+              <a:t>how</a:t>
+            </a:r>
+            <a:r>
+              <a:rPr/>
+              <a:t> </a:t>
+            </a:r>
+            <a:r>
+              <a:rPr/>
+              <a:t>the</a:t>
+            </a:r>
+            <a:r>
+              <a:rPr/>
+              <a:t> </a:t>
+            </a:r>
+            <a:r>
+              <a:rPr/>
+              <a:t>names</a:t>
+            </a:r>
+            <a:r>
+              <a:rPr/>
+              <a:t> </a:t>
+            </a:r>
+            <a:r>
+              <a:rPr/>
+              <a:t>have</a:t>
+            </a:r>
+            <a:r>
+              <a:rPr/>
+              <a:t> </a:t>
+            </a:r>
+            <a:r>
+              <a:rPr/>
+              <a:t>the</a:t>
+            </a:r>
+            <a:r>
+              <a:rPr/>
+              <a:t> </a:t>
+            </a:r>
+            <a:r>
+              <a:rPr/>
+              <a:t>same</a:t>
+            </a:r>
+            <a:r>
+              <a:rPr/>
+              <a:t> </a:t>
+            </a:r>
+            <a:r>
+              <a:rPr/>
+              <a:t>colors</a:t>
+            </a:r>
+            <a:r>
+              <a:rPr/>
+              <a:t> </a:t>
+            </a:r>
+            <a:r>
+              <a:rPr/>
+              <a:t>as</a:t>
+            </a:r>
+            <a:r>
+              <a:rPr/>
+              <a:t> </a:t>
+            </a:r>
+            <a:r>
+              <a:rPr/>
+              <a:t>the</a:t>
+            </a:r>
+            <a:r>
+              <a:rPr/>
+              <a:t> </a:t>
+            </a:r>
+            <a:r>
+              <a:rPr/>
+              <a:t>lines.</a:t>
+            </a:r>
+            <a:r>
+              <a:rPr/>
+              <a:t> </a:t>
+            </a:r>
+            <a:r>
+              <a:rPr/>
+              <a:t>Thie</a:t>
+            </a:r>
+            <a:r>
+              <a:rPr/>
+              <a:t> </a:t>
+            </a:r>
+            <a:r>
+              <a:rPr/>
+              <a:t>exploits</a:t>
+            </a:r>
+            <a:r>
+              <a:rPr/>
+              <a:t> </a:t>
+            </a:r>
+            <a:r>
+              <a:rPr/>
+              <a:t>the</a:t>
+            </a:r>
+            <a:r>
+              <a:rPr/>
+              <a:t> </a:t>
+            </a:r>
+            <a:r>
+              <a:rPr/>
+              <a:t>Gestalt</a:t>
+            </a:r>
+            <a:r>
+              <a:rPr/>
+              <a:t> </a:t>
+            </a:r>
+            <a:r>
+              <a:rPr/>
+              <a:t>principle</a:t>
+            </a:r>
+            <a:r>
+              <a:rPr/>
+              <a:t> </a:t>
+            </a:r>
+            <a:r>
+              <a:rPr/>
+              <a:t>of</a:t>
+            </a:r>
+            <a:r>
+              <a:rPr/>
+              <a:t> </a:t>
+            </a:r>
+            <a:r>
+              <a:rPr/>
+              <a:t>similarity.</a:t>
+            </a:r>
+            <a:r>
+              <a:rPr/>
+              <a:t> </a:t>
+            </a:r>
+            <a:r>
+              <a:rPr/>
+              <a:t>It</a:t>
+            </a:r>
+            <a:r>
+              <a:rPr/>
+              <a:t> </a:t>
+            </a:r>
+            <a:r>
+              <a:rPr/>
+              <a:t>would</a:t>
+            </a:r>
+            <a:r>
+              <a:rPr/>
+              <a:t> </a:t>
+            </a:r>
+            <a:r>
+              <a:rPr/>
+              <a:t>be</a:t>
+            </a:r>
+            <a:r>
+              <a:rPr/>
+              <a:t> </a:t>
+            </a:r>
+            <a:r>
+              <a:rPr/>
+              <a:t>very</a:t>
+            </a:r>
+            <a:r>
+              <a:rPr/>
+              <a:t> </a:t>
+            </a:r>
+            <a:r>
+              <a:rPr/>
+              <a:t>hard</a:t>
+            </a:r>
+            <a:r>
+              <a:rPr/>
+              <a:t> </a:t>
+            </a:r>
+            <a:r>
+              <a:rPr/>
+              <a:t>to</a:t>
+            </a:r>
+            <a:r>
+              <a:rPr/>
+              <a:t> </a:t>
+            </a:r>
+            <a:r>
+              <a:rPr/>
+              <a:t>incorrectly</a:t>
+            </a:r>
+            <a:r>
+              <a:rPr/>
+              <a:t> </a:t>
+            </a:r>
+            <a:r>
+              <a:rPr/>
+              <a:t>assign</a:t>
+            </a:r>
+            <a:r>
+              <a:rPr/>
+              <a:t> </a:t>
+            </a:r>
+            <a:r>
+              <a:rPr/>
+              <a:t>the</a:t>
+            </a:r>
+            <a:r>
+              <a:rPr/>
+              <a:t> </a:t>
+            </a:r>
+            <a:r>
+              <a:rPr/>
+              <a:t>red</a:t>
+            </a:r>
+            <a:r>
+              <a:rPr/>
+              <a:t> </a:t>
+            </a:r>
+            <a:r>
+              <a:rPr/>
+              <a:t>label</a:t>
+            </a:r>
+            <a:r>
+              <a:rPr/>
+              <a:t> </a:t>
+            </a:r>
+            <a:r>
+              <a:rPr/>
+              <a:t>of</a:t>
+            </a:r>
+            <a:r>
+              <a:rPr/>
+              <a:t> </a:t>
+            </a:r>
+            <a:r>
+              <a:rPr/>
+              <a:t>Abel</a:t>
+            </a:r>
+            <a:r>
+              <a:rPr/>
+              <a:t> </a:t>
+            </a:r>
+            <a:r>
+              <a:rPr/>
+              <a:t>with</a:t>
+            </a:r>
+            <a:r>
+              <a:rPr/>
+              <a:t> </a:t>
+            </a:r>
+            <a:r>
+              <a:rPr/>
+              <a:t>the</a:t>
+            </a:r>
+            <a:r>
+              <a:rPr/>
+              <a:t> </a:t>
+            </a:r>
+            <a:r>
+              <a:rPr/>
+              <a:t>green</a:t>
+            </a:r>
+            <a:r>
+              <a:rPr/>
+              <a:t> </a:t>
+            </a:r>
+            <a:r>
+              <a:rPr/>
+              <a:t>line</a:t>
+            </a:r>
+            <a:r>
+              <a:rPr/>
+              <a:t> </a:t>
+            </a:r>
+            <a:r>
+              <a:rPr/>
+              <a:t>of</a:t>
+            </a:r>
+            <a:r>
+              <a:rPr/>
+              <a:t> </a:t>
+            </a:r>
+            <a:r>
+              <a:rPr/>
+              <a:t>Baker.</a:t>
+            </a:r>
+            <a:r>
+              <a:rPr/>
+              <a:t> </a:t>
+            </a:r>
+            <a:r>
+              <a:rPr/>
+              <a:t>Notice</a:t>
+            </a:r>
+            <a:r>
+              <a:rPr/>
+              <a:t> </a:t>
+            </a:r>
+            <a:r>
+              <a:rPr/>
+              <a:t>further</a:t>
+            </a:r>
+            <a:r>
+              <a:rPr/>
+              <a:t> </a:t>
+            </a:r>
+            <a:r>
+              <a:rPr/>
+              <a:t>that</a:t>
+            </a:r>
+            <a:r>
+              <a:rPr/>
+              <a:t> </a:t>
+            </a:r>
+            <a:r>
+              <a:rPr/>
+              <a:t>the</a:t>
+            </a:r>
+            <a:r>
+              <a:rPr/>
+              <a:t> </a:t>
+            </a:r>
+            <a:r>
+              <a:rPr/>
+              <a:t>labels</a:t>
+            </a:r>
+            <a:r>
+              <a:rPr/>
+              <a:t> </a:t>
+            </a:r>
+            <a:r>
+              <a:rPr/>
+              <a:t>have</a:t>
+            </a:r>
+            <a:r>
+              <a:rPr/>
+              <a:t> </a:t>
+            </a:r>
+            <a:r>
+              <a:rPr/>
+              <a:t>a</a:t>
+            </a:r>
+            <a:r>
+              <a:rPr/>
+              <a:t> </a:t>
+            </a:r>
+            <a:r>
+              <a:rPr/>
+              <a:t>slope</a:t>
+            </a:r>
+            <a:r>
+              <a:rPr/>
+              <a:t> </a:t>
+            </a:r>
+            <a:r>
+              <a:rPr/>
+              <a:t>that</a:t>
+            </a:r>
+            <a:r>
+              <a:rPr/>
+              <a:t> </a:t>
+            </a:r>
+            <a:r>
+              <a:rPr/>
+              <a:t>roughly</a:t>
+            </a:r>
+            <a:r>
+              <a:rPr/>
+              <a:t> </a:t>
+            </a:r>
+            <a:r>
+              <a:rPr/>
+              <a:t>matches</a:t>
+            </a:r>
+            <a:r>
+              <a:rPr/>
+              <a:t> </a:t>
+            </a:r>
+            <a:r>
+              <a:rPr/>
+              <a:t>the</a:t>
+            </a:r>
+            <a:r>
+              <a:rPr/>
+              <a:t> </a:t>
+            </a:r>
+            <a:r>
+              <a:rPr/>
+              <a:t>lines</a:t>
+            </a:r>
+            <a:r>
+              <a:rPr/>
+              <a:t> </a:t>
+            </a:r>
+            <a:r>
+              <a:rPr/>
+              <a:t>they</a:t>
+            </a:r>
+            <a:r>
+              <a:rPr/>
+              <a:t> </a:t>
+            </a:r>
+            <a:r>
+              <a:rPr/>
+              <a:t>are</a:t>
+            </a:r>
+            <a:r>
+              <a:rPr/>
+              <a:t> </a:t>
+            </a:r>
+            <a:r>
+              <a:rPr/>
+              <a:t>attached</a:t>
+            </a:r>
+            <a:r>
+              <a:rPr/>
+              <a:t> </a:t>
+            </a:r>
+            <a:r>
+              <a:rPr/>
+              <a:t>to.</a:t>
+            </a:r>
+            <a:r>
+              <a:rPr/>
+              <a:t> </a:t>
+            </a:r>
+            <a:r>
+              <a:rPr/>
+              <a:t>This</a:t>
+            </a:r>
+            <a:r>
+              <a:rPr/>
+              <a:t> </a:t>
+            </a:r>
+            <a:r>
+              <a:rPr/>
+              <a:t>exploits</a:t>
+            </a:r>
+            <a:r>
+              <a:rPr/>
+              <a:t> </a:t>
+            </a:r>
+            <a:r>
+              <a:rPr/>
+              <a:t>the</a:t>
+            </a:r>
+            <a:r>
+              <a:rPr/>
+              <a:t> </a:t>
+            </a:r>
+            <a:r>
+              <a:rPr/>
+              <a:t>Gestalt</a:t>
+            </a:r>
+            <a:r>
+              <a:rPr/>
+              <a:t> </a:t>
+            </a:r>
+            <a:r>
+              <a:rPr/>
+              <a:t>principle</a:t>
+            </a:r>
+            <a:r>
+              <a:rPr/>
+              <a:t> </a:t>
+            </a:r>
+            <a:r>
+              <a:rPr/>
+              <a:t>of</a:t>
+            </a:r>
+            <a:r>
+              <a:rPr/>
+              <a:t> </a:t>
+            </a:r>
+            <a:r>
+              <a:rPr/>
+              <a:t>common</a:t>
+            </a:r>
+            <a:r>
+              <a:rPr/>
+              <a:t> </a:t>
+            </a:r>
+            <a:r>
+              <a:rPr/>
+              <a:t>fate.</a:t>
+            </a:r>
+          </a:p>
+        </p:txBody>
+      </p:sp>
+      <p:sp>
+        <p:nvSpPr>
+          <p:cNvPr id="4" name="Slide Number Placeholder 3"/>
+          <p:cNvSpPr>
+            <a:spLocks noGrp="1"/>
+          </p:cNvSpPr>
+          <p:nvPr>
+            <p:ph type="sldNum" sz="quarter" idx="10"/>
+          </p:nvPr>
+        </p:nvSpPr>
+        <p:spPr/>
+        <p:txBody>
+          <a:bodyPr/>
+          <a:lstStyle/>
+          <a:p>
+            <a:fld id="{18BDFEC3-8487-43E8-A154-7C12CBC1FFF2}" type="slidenum">
+              <a:rPr lang="en-US"/>
+              <a:t>15</a:t>
+            </a:fld>
+            <a:endParaRPr lang="en-US"/>
+          </a:p>
+        </p:txBody>
+      </p:sp>
+    </p:spTree>
+  </p:cSld>
+</p:notes>
+</file>
+
+<file path=ppt/notesSlides/notesSlide11.xml><?xml version="1.0" encoding="utf-8"?>
+<p:notes xmlns:a="http://schemas.openxmlformats.org/drawingml/2006/main" xmlns:r="http://schemas.openxmlformats.org/officeDocument/2006/relationships" xmlns:p="http://schemas.openxmlformats.org/presentationml/2006/main">
+  <p:cSld>
+    <p:spTree>
+      <p:nvGrpSpPr>
+        <p:cNvPr id="1" name=""/>
+        <p:cNvGrpSpPr/>
+        <p:nvPr/>
+      </p:nvGrpSpPr>
+      <p:grpSpPr>
+        <a:xfrm>
+          <a:off x="0" y="0"/>
+          <a:ext cx="0" cy="0"/>
+          <a:chOff x="0" y="0"/>
+          <a:chExt cx="0" cy="0"/>
+        </a:xfrm>
+      </p:grpSpPr>
+      <p:sp>
+        <p:nvSpPr>
+          <p:cNvPr id="2" name="Slide Image Placeholder 1"/>
+          <p:cNvSpPr>
+            <a:spLocks noGrp="1" noRot="1" noChangeAspect="1"/>
+          </p:cNvSpPr>
+          <p:nvPr>
+            <p:ph type="sldImg"/>
+          </p:nvPr>
+        </p:nvSpPr>
+        <p:spPr/>
+      </p:sp>
+      <p:sp>
+        <p:nvSpPr>
+          <p:cNvPr id="3" name="Notes Placeholder 2"/>
+          <p:cNvSpPr>
+            <a:spLocks noGrp="1"/>
+          </p:cNvSpPr>
+          <p:nvPr>
+            <p:ph type="body" idx="1"/>
+          </p:nvPr>
+        </p:nvSpPr>
+        <p:spPr/>
+        <p:txBody>
+          <a:bodyPr/>
+          <a:lstStyle/>
+          <a:p>
+            <a:pPr lvl="0" marL="0" indent="0">
+              <a:buNone/>
+            </a:pPr>
+            <a:r>
+              <a:rPr/>
               <a:t>There</a:t>
             </a:r>
             <a:r>
@@ -1740,7 +2478,7 @@
             </a:pPr>
             <a:r>
               <a:rPr/>
-              <a:t>You</a:t>
+              <a:t>Here</a:t>
             </a:r>
             <a:r>
               <a:rPr/>
@@ -1756,22 +2494,6 @@
             </a:r>
             <a:r>
               <a:rPr/>
-              <a:t>relying</a:t>
-            </a:r>
-            <a:r>
-              <a:rPr/>
-              <a:t> </a:t>
-            </a:r>
-            <a:r>
-              <a:rPr/>
-              <a:t>on</a:t>
-            </a:r>
-            <a:r>
-              <a:rPr/>
-              <a:t> </a:t>
-            </a:r>
-            <a:r>
-              <a:rPr/>
               <a:t>the</a:t>
             </a:r>
             <a:r>
@@ -1780,47 +2502,87 @@
             </a:r>
             <a:r>
               <a:rPr/>
-              <a:t>principle</a:t>
-            </a:r>
-            <a:r>
-              <a:rPr/>
-              <a:t> </a:t>
-            </a:r>
-            <a:r>
-              <a:rPr/>
-              <a:t>of</a:t>
-            </a:r>
-            <a:r>
-              <a:rPr/>
-              <a:t> </a:t>
-            </a:r>
-            <a:r>
-              <a:rPr/>
-              <a:t>similarity,</a:t>
-            </a:r>
-            <a:r>
-              <a:rPr/>
-              <a:t> </a:t>
-            </a:r>
-            <a:r>
-              <a:rPr/>
-              <a:t>and</a:t>
-            </a:r>
-            <a:r>
-              <a:rPr/>
-              <a:t> </a:t>
-            </a:r>
-            <a:r>
-              <a:rPr/>
-              <a:t>there</a:t>
-            </a:r>
-            <a:r>
-              <a:rPr/>
-              <a:t> </a:t>
-            </a:r>
-            <a:r>
-              <a:rPr/>
-              <a:t>needs</a:t>
+              <a:t>shape</a:t>
+            </a:r>
+            <a:r>
+              <a:rPr/>
+              <a:t> </a:t>
+            </a:r>
+            <a:r>
+              <a:rPr/>
+              <a:t>choices</a:t>
+            </a:r>
+            <a:r>
+              <a:rPr/>
+              <a:t> </a:t>
+            </a:r>
+            <a:r>
+              <a:rPr/>
+              <a:t>available</a:t>
+            </a:r>
+            <a:r>
+              <a:rPr/>
+              <a:t> </a:t>
+            </a:r>
+            <a:r>
+              <a:rPr/>
+              <a:t>in</a:t>
+            </a:r>
+            <a:r>
+              <a:rPr/>
+              <a:t> </a:t>
+            </a:r>
+            <a:r>
+              <a:rPr/>
+              <a:t>R.</a:t>
+            </a:r>
+            <a:r>
+              <a:rPr/>
+              <a:t> </a:t>
+            </a:r>
+            <a:r>
+              <a:rPr/>
+              <a:t>It</a:t>
+            </a:r>
+            <a:r>
+              <a:rPr/>
+              <a:t> </a:t>
+            </a:r>
+            <a:r>
+              <a:rPr/>
+              <a:t>should</a:t>
+            </a:r>
+            <a:r>
+              <a:rPr/>
+              <a:t> </a:t>
+            </a:r>
+            <a:r>
+              <a:rPr/>
+              <a:t>not</a:t>
+            </a:r>
+            <a:r>
+              <a:rPr/>
+              <a:t> </a:t>
+            </a:r>
+            <a:r>
+              <a:rPr/>
+              <a:t>be</a:t>
+            </a:r>
+            <a:r>
+              <a:rPr/>
+              <a:t> </a:t>
+            </a:r>
+            <a:r>
+              <a:rPr/>
+              <a:t>too</a:t>
+            </a:r>
+            <a:r>
+              <a:rPr/>
+              <a:t> </a:t>
+            </a:r>
+            <a:r>
+              <a:rPr/>
+              <a:t>hard</a:t>
             </a:r>
             <a:r>
               <a:rPr/>
@@ -1836,255 +2598,79 @@
             </a:r>
             <a:r>
               <a:rPr/>
-              <a:t>be</a:t>
-            </a:r>
-            <a:r>
-              <a:rPr/>
-              <a:t> </a:t>
-            </a:r>
-            <a:r>
-              <a:rPr/>
-              <a:t>sufficient</a:t>
-            </a:r>
-            <a:r>
-              <a:rPr/>
-              <a:t> </a:t>
-            </a:r>
-            <a:r>
-              <a:rPr/>
-              <a:t>dissimilarity</a:t>
-            </a:r>
-            <a:r>
-              <a:rPr/>
-              <a:t> </a:t>
-            </a:r>
-            <a:r>
-              <a:rPr/>
-              <a:t>in</a:t>
-            </a:r>
-            <a:r>
-              <a:rPr/>
-              <a:t> </a:t>
-            </a:r>
-            <a:r>
-              <a:rPr/>
-              <a:t>the</a:t>
-            </a:r>
-            <a:r>
-              <a:rPr/>
-              <a:t> </a:t>
-            </a:r>
-            <a:r>
-              <a:rPr/>
-              <a:t>different</a:t>
-            </a:r>
-            <a:r>
-              <a:rPr/>
-              <a:t> </a:t>
-            </a:r>
-            <a:r>
-              <a:rPr/>
-              <a:t>symbols</a:t>
-            </a:r>
-            <a:r>
-              <a:rPr/>
-              <a:t> </a:t>
-            </a:r>
-            <a:r>
-              <a:rPr/>
-              <a:t>to</a:t>
-            </a:r>
-            <a:r>
-              <a:rPr/>
-              <a:t> </a:t>
-            </a:r>
-            <a:r>
-              <a:rPr/>
-              <a:t>make</a:t>
-            </a:r>
-            <a:r>
-              <a:rPr/>
-              <a:t> </a:t>
-            </a:r>
-            <a:r>
-              <a:rPr/>
-              <a:t>this</a:t>
-            </a:r>
-            <a:r>
-              <a:rPr/>
-              <a:t> </a:t>
-            </a:r>
-            <a:r>
-              <a:rPr/>
-              <a:t>work.</a:t>
-            </a:r>
-            <a:r>
-              <a:rPr/>
-              <a:t> </a:t>
-            </a:r>
-            <a:r>
-              <a:rPr/>
-              <a:t>A</a:t>
-            </a:r>
-            <a:r>
-              <a:rPr/>
-              <a:t> </a:t>
-            </a:r>
-            <a:r>
-              <a:rPr/>
-              <a:t>closed</a:t>
-            </a:r>
-            <a:r>
-              <a:rPr/>
-              <a:t> </a:t>
-            </a:r>
-            <a:r>
-              <a:rPr/>
-              <a:t>circle,</a:t>
-            </a:r>
-            <a:r>
-              <a:rPr/>
-              <a:t> </a:t>
-            </a:r>
-            <a:r>
-              <a:rPr/>
-              <a:t>a</a:t>
-            </a:r>
-            <a:r>
-              <a:rPr/>
-              <a:t> </a:t>
-            </a:r>
-            <a:r>
-              <a:rPr/>
-              <a:t>closed</a:t>
-            </a:r>
-            <a:r>
-              <a:rPr/>
-              <a:t> </a:t>
-            </a:r>
-            <a:r>
-              <a:rPr/>
-              <a:t>square,</a:t>
-            </a:r>
-            <a:r>
-              <a:rPr/>
-              <a:t> </a:t>
-            </a:r>
-            <a:r>
-              <a:rPr/>
-              <a:t>and</a:t>
-            </a:r>
-            <a:r>
-              <a:rPr/>
-              <a:t> </a:t>
-            </a:r>
-            <a:r>
-              <a:rPr/>
-              <a:t>a</a:t>
-            </a:r>
-            <a:r>
-              <a:rPr/>
-              <a:t> </a:t>
-            </a:r>
-            <a:r>
-              <a:rPr/>
-              <a:t>closed</a:t>
-            </a:r>
-            <a:r>
-              <a:rPr/>
-              <a:t> </a:t>
-            </a:r>
-            <a:r>
-              <a:rPr/>
-              <a:t>triangle</a:t>
-            </a:r>
-            <a:r>
-              <a:rPr/>
-              <a:t> </a:t>
-            </a:r>
-            <a:r>
-              <a:rPr/>
-              <a:t>all</a:t>
-            </a:r>
-            <a:r>
-              <a:rPr/>
-              <a:t> </a:t>
-            </a:r>
-            <a:r>
-              <a:rPr/>
-              <a:t>loop</a:t>
-            </a:r>
-            <a:r>
-              <a:rPr/>
-              <a:t> </a:t>
-            </a:r>
-            <a:r>
-              <a:rPr/>
-              <a:t>pretty</a:t>
-            </a:r>
-            <a:r>
-              <a:rPr/>
-              <a:t> </a:t>
-            </a:r>
-            <a:r>
-              <a:rPr/>
-              <a:t>much</a:t>
-            </a:r>
-            <a:r>
-              <a:rPr/>
-              <a:t> </a:t>
-            </a:r>
-            <a:r>
-              <a:rPr/>
-              <a:t>alike.</a:t>
-            </a:r>
-            <a:r>
-              <a:rPr/>
-              <a:t> </a:t>
-            </a:r>
-            <a:r>
-              <a:rPr/>
-              <a:t>How</a:t>
-            </a:r>
-            <a:r>
-              <a:rPr/>
-              <a:t> </a:t>
-            </a:r>
-            <a:r>
-              <a:rPr/>
-              <a:t>can</a:t>
-            </a:r>
-            <a:r>
-              <a:rPr/>
-              <a:t> </a:t>
-            </a:r>
-            <a:r>
-              <a:rPr/>
-              <a:t>you</a:t>
-            </a:r>
-            <a:r>
-              <a:rPr/>
-              <a:t> </a:t>
-            </a:r>
-            <a:r>
-              <a:rPr/>
-              <a:t>get</a:t>
-            </a:r>
-            <a:r>
-              <a:rPr/>
-              <a:t> </a:t>
-            </a:r>
-            <a:r>
-              <a:rPr/>
-              <a:t>more</a:t>
-            </a:r>
-            <a:r>
-              <a:rPr/>
-              <a:t> </a:t>
-            </a:r>
-            <a:r>
-              <a:rPr/>
-              <a:t>contrast?</a:t>
+              <a:t>choose</a:t>
+            </a:r>
+            <a:r>
+              <a:rPr/>
+              <a:t> </a:t>
+            </a:r>
+            <a:r>
+              <a:rPr/>
+              <a:t>three</a:t>
+            </a:r>
+            <a:r>
+              <a:rPr/>
+              <a:t> </a:t>
+            </a:r>
+            <a:r>
+              <a:rPr/>
+              <a:t>shapes</a:t>
+            </a:r>
+            <a:r>
+              <a:rPr/>
+              <a:t> </a:t>
+            </a:r>
+            <a:r>
+              <a:rPr/>
+              <a:t>that</a:t>
+            </a:r>
+            <a:r>
+              <a:rPr/>
+              <a:t> </a:t>
+            </a:r>
+            <a:r>
+              <a:rPr/>
+              <a:t>are</a:t>
+            </a:r>
+            <a:r>
+              <a:rPr/>
+              <a:t> </a:t>
+            </a:r>
+            <a:r>
+              <a:rPr/>
+              <a:t>markedly</a:t>
+            </a:r>
+            <a:r>
+              <a:rPr/>
+              <a:t> </a:t>
+            </a:r>
+            <a:r>
+              <a:rPr/>
+              <a:t>distinct</a:t>
+            </a:r>
+            <a:r>
+              <a:rPr/>
+              <a:t> </a:t>
+            </a:r>
+            <a:r>
+              <a:rPr/>
+              <a:t>from</a:t>
+            </a:r>
+            <a:r>
+              <a:rPr/>
+              <a:t> </a:t>
+            </a:r>
+            <a:r>
+              <a:rPr/>
+              <a:t>one</a:t>
+            </a:r>
+            <a:r>
+              <a:rPr/>
+              <a:t> </a:t>
+            </a:r>
+            <a:r>
+              <a:rPr/>
+              <a:t>another.</a:t>
             </a:r>
           </a:p>
         </p:txBody>
@@ -2106,7 +2692,7 @@
           <a:p>
             <a:fld id="{18BDFEC3-8487-43E8-A154-7C12CBC1FFF2}" type="slidenum">
               <a:rPr lang="en-US"/>
-              <a:t>7</a:t>
+              <a:t>6</a:t>
             </a:fld>
             <a:endParaRPr lang="en-US"/>
           </a:p>
@@ -2166,6 +2752,46 @@
             </a:pPr>
             <a:r>
               <a:rPr/>
+              <a:t>Here</a:t>
+            </a:r>
+            <a:r>
+              <a:rPr/>
+              <a:t> </a:t>
+            </a:r>
+            <a:r>
+              <a:rPr/>
+              <a:t>is</a:t>
+            </a:r>
+            <a:r>
+              <a:rPr/>
+              <a:t> </a:t>
+            </a:r>
+            <a:r>
+              <a:rPr/>
+              <a:t>one</a:t>
+            </a:r>
+            <a:r>
+              <a:rPr/>
+              <a:t> </a:t>
+            </a:r>
+            <a:r>
+              <a:rPr/>
+              <a:t>possible</a:t>
+            </a:r>
+            <a:r>
+              <a:rPr/>
+              <a:t> </a:t>
+            </a:r>
+            <a:r>
+              <a:rPr/>
+              <a:t>choice.</a:t>
+            </a:r>
+            <a:r>
+              <a:rPr/>
+              <a:t> </a:t>
+            </a:r>
+            <a:r>
+              <a:rPr/>
               <a:t>You</a:t>
             </a:r>
             <a:r>
@@ -2174,23 +2800,63 @@
             </a:r>
             <a:r>
               <a:rPr/>
-              <a:t>are</a:t>
-            </a:r>
-            <a:r>
-              <a:rPr/>
-              <a:t> </a:t>
-            </a:r>
-            <a:r>
-              <a:rPr/>
-              <a:t>relying</a:t>
-            </a:r>
-            <a:r>
-              <a:rPr/>
-              <a:t> </a:t>
-            </a:r>
-            <a:r>
-              <a:rPr/>
-              <a:t>on</a:t>
+              <a:t>can</a:t>
+            </a:r>
+            <a:r>
+              <a:rPr/>
+              <a:t> </a:t>
+            </a:r>
+            <a:r>
+              <a:rPr/>
+              <a:t>more</a:t>
+            </a:r>
+            <a:r>
+              <a:rPr/>
+              <a:t> </a:t>
+            </a:r>
+            <a:r>
+              <a:rPr/>
+              <a:t>clearly</a:t>
+            </a:r>
+            <a:r>
+              <a:rPr/>
+              <a:t> </a:t>
+            </a:r>
+            <a:r>
+              <a:rPr/>
+              <a:t>see</a:t>
+            </a:r>
+            <a:r>
+              <a:rPr/>
+              <a:t> </a:t>
+            </a:r>
+            <a:r>
+              <a:rPr/>
+              <a:t>differences</a:t>
+            </a:r>
+            <a:r>
+              <a:rPr/>
+              <a:t> </a:t>
+            </a:r>
+            <a:r>
+              <a:rPr/>
+              <a:t>when</a:t>
+            </a:r>
+            <a:r>
+              <a:rPr/>
+              <a:t> </a:t>
+            </a:r>
+            <a:r>
+              <a:rPr/>
+              <a:t>you</a:t>
+            </a:r>
+            <a:r>
+              <a:rPr/>
+              <a:t> </a:t>
+            </a:r>
+            <a:r>
+              <a:rPr/>
+              <a:t>use</a:t>
             </a:r>
             <a:r>
               <a:rPr/>
@@ -2206,23 +2872,31 @@
             </a:r>
             <a:r>
               <a:rPr/>
-              <a:t>principle</a:t>
-            </a:r>
-            <a:r>
-              <a:rPr/>
-              <a:t> </a:t>
-            </a:r>
-            <a:r>
-              <a:rPr/>
-              <a:t>of</a:t>
-            </a:r>
-            <a:r>
-              <a:rPr/>
-              <a:t> </a:t>
-            </a:r>
-            <a:r>
-              <a:rPr/>
-              <a:t>similarity,</a:t>
+              <a:t>solid</a:t>
+            </a:r>
+            <a:r>
+              <a:rPr/>
+              <a:t> </a:t>
+            </a:r>
+            <a:r>
+              <a:rPr/>
+              <a:t>square,</a:t>
+            </a:r>
+            <a:r>
+              <a:rPr/>
+              <a:t> </a:t>
+            </a:r>
+            <a:r>
+              <a:rPr/>
+              <a:t>open</a:t>
+            </a:r>
+            <a:r>
+              <a:rPr/>
+              <a:t> </a:t>
+            </a:r>
+            <a:r>
+              <a:rPr/>
+              <a:t>circle,</a:t>
             </a:r>
             <a:r>
               <a:rPr/>
@@ -2238,47 +2912,111 @@
             </a:r>
             <a:r>
               <a:rPr/>
-              <a:t>there</a:t>
-            </a:r>
-            <a:r>
-              <a:rPr/>
-              <a:t> </a:t>
-            </a:r>
-            <a:r>
-              <a:rPr/>
-              <a:t>needs</a:t>
-            </a:r>
-            <a:r>
-              <a:rPr/>
-              <a:t> </a:t>
-            </a:r>
-            <a:r>
-              <a:rPr/>
-              <a:t>to</a:t>
-            </a:r>
-            <a:r>
-              <a:rPr/>
-              <a:t> </a:t>
-            </a:r>
-            <a:r>
-              <a:rPr/>
-              <a:t>be</a:t>
-            </a:r>
-            <a:r>
-              <a:rPr/>
-              <a:t> </a:t>
-            </a:r>
-            <a:r>
-              <a:rPr/>
-              <a:t>sufficient</a:t>
-            </a:r>
-            <a:r>
-              <a:rPr/>
-              <a:t> </a:t>
-            </a:r>
-            <a:r>
-              <a:rPr/>
-              <a:t>dissimilarity</a:t>
+              <a:t>plus</a:t>
+            </a:r>
+            <a:r>
+              <a:rPr/>
+              <a:t> </a:t>
+            </a:r>
+            <a:r>
+              <a:rPr/>
+              <a:t>sign.</a:t>
+            </a:r>
+            <a:r>
+              <a:rPr/>
+              <a:t> </a:t>
+            </a:r>
+            <a:r>
+              <a:rPr/>
+              <a:t>It</a:t>
+            </a:r>
+            <a:r>
+              <a:rPr/>
+              <a:t> </a:t>
+            </a:r>
+            <a:r>
+              <a:rPr/>
+              <a:t>gets</a:t>
+            </a:r>
+            <a:r>
+              <a:rPr/>
+              <a:t> </a:t>
+            </a:r>
+            <a:r>
+              <a:rPr/>
+              <a:t>more</a:t>
+            </a:r>
+            <a:r>
+              <a:rPr/>
+              <a:t> </a:t>
+            </a:r>
+            <a:r>
+              <a:rPr/>
+              <a:t>difficult</a:t>
+            </a:r>
+            <a:r>
+              <a:rPr/>
+              <a:t> </a:t>
+            </a:r>
+            <a:r>
+              <a:rPr/>
+              <a:t>if</a:t>
+            </a:r>
+            <a:r>
+              <a:rPr/>
+              <a:t> </a:t>
+            </a:r>
+            <a:r>
+              <a:rPr/>
+              <a:t>you</a:t>
+            </a:r>
+            <a:r>
+              <a:rPr/>
+              <a:t> </a:t>
+            </a:r>
+            <a:r>
+              <a:rPr/>
+              <a:t>have</a:t>
+            </a:r>
+            <a:r>
+              <a:rPr/>
+              <a:t> </a:t>
+            </a:r>
+            <a:r>
+              <a:rPr/>
+              <a:t>a</a:t>
+            </a:r>
+            <a:r>
+              <a:rPr/>
+              <a:t> </a:t>
+            </a:r>
+            <a:r>
+              <a:rPr/>
+              <a:t>fourth</a:t>
+            </a:r>
+            <a:r>
+              <a:rPr/>
+              <a:t> </a:t>
+            </a:r>
+            <a:r>
+              <a:rPr/>
+              <a:t>or</a:t>
+            </a:r>
+            <a:r>
+              <a:rPr/>
+              <a:t> </a:t>
+            </a:r>
+            <a:r>
+              <a:rPr/>
+              <a:t>fifth</a:t>
+            </a:r>
+            <a:r>
+              <a:rPr/>
+              <a:t> </a:t>
+            </a:r>
+            <a:r>
+              <a:rPr/>
+              <a:t>symbol</a:t>
             </a:r>
             <a:r>
               <a:rPr/>
@@ -2302,215 +3040,7 @@
             </a:r>
             <a:r>
               <a:rPr/>
-              <a:t>different</a:t>
-            </a:r>
-            <a:r>
-              <a:rPr/>
-              <a:t> </a:t>
-            </a:r>
-            <a:r>
-              <a:rPr/>
-              <a:t>symbols</a:t>
-            </a:r>
-            <a:r>
-              <a:rPr/>
-              <a:t> </a:t>
-            </a:r>
-            <a:r>
-              <a:rPr/>
-              <a:t>to</a:t>
-            </a:r>
-            <a:r>
-              <a:rPr/>
-              <a:t> </a:t>
-            </a:r>
-            <a:r>
-              <a:rPr/>
-              <a:t>make</a:t>
-            </a:r>
-            <a:r>
-              <a:rPr/>
-              <a:t> </a:t>
-            </a:r>
-            <a:r>
-              <a:rPr/>
-              <a:t>this</a:t>
-            </a:r>
-            <a:r>
-              <a:rPr/>
-              <a:t> </a:t>
-            </a:r>
-            <a:r>
-              <a:rPr/>
-              <a:t>work.</a:t>
-            </a:r>
-            <a:r>
-              <a:rPr/>
-              <a:t> </a:t>
-            </a:r>
-            <a:r>
-              <a:rPr/>
-              <a:t>A</a:t>
-            </a:r>
-            <a:r>
-              <a:rPr/>
-              <a:t> </a:t>
-            </a:r>
-            <a:r>
-              <a:rPr/>
-              <a:t>closed</a:t>
-            </a:r>
-            <a:r>
-              <a:rPr/>
-              <a:t> </a:t>
-            </a:r>
-            <a:r>
-              <a:rPr/>
-              <a:t>circle,</a:t>
-            </a:r>
-            <a:r>
-              <a:rPr/>
-              <a:t> </a:t>
-            </a:r>
-            <a:r>
-              <a:rPr/>
-              <a:t>a</a:t>
-            </a:r>
-            <a:r>
-              <a:rPr/>
-              <a:t> </a:t>
-            </a:r>
-            <a:r>
-              <a:rPr/>
-              <a:t>closed</a:t>
-            </a:r>
-            <a:r>
-              <a:rPr/>
-              <a:t> </a:t>
-            </a:r>
-            <a:r>
-              <a:rPr/>
-              <a:t>square,</a:t>
-            </a:r>
-            <a:r>
-              <a:rPr/>
-              <a:t> </a:t>
-            </a:r>
-            <a:r>
-              <a:rPr/>
-              <a:t>and</a:t>
-            </a:r>
-            <a:r>
-              <a:rPr/>
-              <a:t> </a:t>
-            </a:r>
-            <a:r>
-              <a:rPr/>
-              <a:t>a</a:t>
-            </a:r>
-            <a:r>
-              <a:rPr/>
-              <a:t> </a:t>
-            </a:r>
-            <a:r>
-              <a:rPr/>
-              <a:t>closed</a:t>
-            </a:r>
-            <a:r>
-              <a:rPr/>
-              <a:t> </a:t>
-            </a:r>
-            <a:r>
-              <a:rPr/>
-              <a:t>triangle</a:t>
-            </a:r>
-            <a:r>
-              <a:rPr/>
-              <a:t> </a:t>
-            </a:r>
-            <a:r>
-              <a:rPr/>
-              <a:t>all</a:t>
-            </a:r>
-            <a:r>
-              <a:rPr/>
-              <a:t> </a:t>
-            </a:r>
-            <a:r>
-              <a:rPr/>
-              <a:t>loop</a:t>
-            </a:r>
-            <a:r>
-              <a:rPr/>
-              <a:t> </a:t>
-            </a:r>
-            <a:r>
-              <a:rPr/>
-              <a:t>pretty</a:t>
-            </a:r>
-            <a:r>
-              <a:rPr/>
-              <a:t> </a:t>
-            </a:r>
-            <a:r>
-              <a:rPr/>
-              <a:t>much</a:t>
-            </a:r>
-            <a:r>
-              <a:rPr/>
-              <a:t> </a:t>
-            </a:r>
-            <a:r>
-              <a:rPr/>
-              <a:t>alike.</a:t>
-            </a:r>
-            <a:r>
-              <a:rPr/>
-              <a:t> </a:t>
-            </a:r>
-            <a:r>
-              <a:rPr/>
-              <a:t>How</a:t>
-            </a:r>
-            <a:r>
-              <a:rPr/>
-              <a:t> </a:t>
-            </a:r>
-            <a:r>
-              <a:rPr/>
-              <a:t>can</a:t>
-            </a:r>
-            <a:r>
-              <a:rPr/>
-              <a:t> </a:t>
-            </a:r>
-            <a:r>
-              <a:rPr/>
-              <a:t>you</a:t>
-            </a:r>
-            <a:r>
-              <a:rPr/>
-              <a:t> </a:t>
-            </a:r>
-            <a:r>
-              <a:rPr/>
-              <a:t>get</a:t>
-            </a:r>
-            <a:r>
-              <a:rPr/>
-              <a:t> </a:t>
-            </a:r>
-            <a:r>
-              <a:rPr/>
-              <a:t>more</a:t>
-            </a:r>
-            <a:r>
-              <a:rPr/>
-              <a:t> </a:t>
-            </a:r>
-            <a:r>
-              <a:rPr/>
-              <a:t>contrast?</a:t>
+              <a:t>mix.</a:t>
             </a:r>
           </a:p>
         </p:txBody>
@@ -2532,7 +3062,7 @@
           <a:p>
             <a:fld id="{18BDFEC3-8487-43E8-A154-7C12CBC1FFF2}" type="slidenum">
               <a:rPr lang="en-US"/>
-              <a:t>8</a:t>
+              <a:t>7</a:t>
             </a:fld>
             <a:endParaRPr lang="en-US"/>
           </a:p>
@@ -2600,6 +3130,86 @@
             </a:r>
             <a:r>
               <a:rPr/>
+              <a:t>can</a:t>
+            </a:r>
+            <a:r>
+              <a:rPr/>
+              <a:t> </a:t>
+            </a:r>
+            <a:r>
+              <a:rPr/>
+              <a:t>use</a:t>
+            </a:r>
+            <a:r>
+              <a:rPr/>
+              <a:t> </a:t>
+            </a:r>
+            <a:r>
+              <a:rPr/>
+              <a:t>color</a:t>
+            </a:r>
+            <a:r>
+              <a:rPr/>
+              <a:t> </a:t>
+            </a:r>
+            <a:r>
+              <a:rPr/>
+              <a:t>to</a:t>
+            </a:r>
+            <a:r>
+              <a:rPr/>
+              <a:t> </a:t>
+            </a:r>
+            <a:r>
+              <a:rPr/>
+              <a:t>emphasize</a:t>
+            </a:r>
+            <a:r>
+              <a:rPr/>
+              <a:t> </a:t>
+            </a:r>
+            <a:r>
+              <a:rPr/>
+              <a:t>the</a:t>
+            </a:r>
+            <a:r>
+              <a:rPr/>
+              <a:t> </a:t>
+            </a:r>
+            <a:r>
+              <a:rPr/>
+              <a:t>groupings.</a:t>
+            </a:r>
+            <a:r>
+              <a:rPr/>
+              <a:t> </a:t>
+            </a:r>
+            <a:r>
+              <a:rPr/>
+              <a:t>Here</a:t>
+            </a:r>
+            <a:r>
+              <a:rPr/>
+              <a:t> </a:t>
+            </a:r>
+            <a:r>
+              <a:rPr/>
+              <a:t>the</a:t>
+            </a:r>
+            <a:r>
+              <a:rPr/>
+              <a:t> </a:t>
+            </a:r>
+            <a:r>
+              <a:rPr/>
+              <a:t>colors</a:t>
+            </a:r>
+            <a:r>
+              <a:rPr/>
+              <a:t> </a:t>
+            </a:r>
+            <a:r>
+              <a:rPr/>
               <a:t>are</a:t>
             </a:r>
             <a:r>
@@ -2608,15 +3218,151 @@
             </a:r>
             <a:r>
               <a:rPr/>
-              <a:t>relying</a:t>
-            </a:r>
-            <a:r>
-              <a:rPr/>
-              <a:t> </a:t>
-            </a:r>
-            <a:r>
-              <a:rPr/>
-              <a:t>on</a:t>
+              <a:t>red,</a:t>
+            </a:r>
+            <a:r>
+              <a:rPr/>
+              <a:t> </a:t>
+            </a:r>
+            <a:r>
+              <a:rPr/>
+              <a:t>dark</a:t>
+            </a:r>
+            <a:r>
+              <a:rPr/>
+              <a:t> </a:t>
+            </a:r>
+            <a:r>
+              <a:rPr/>
+              <a:t>green,</a:t>
+            </a:r>
+            <a:r>
+              <a:rPr/>
+              <a:t> </a:t>
+            </a:r>
+            <a:r>
+              <a:rPr/>
+              <a:t>and</a:t>
+            </a:r>
+            <a:r>
+              <a:rPr/>
+              <a:t> </a:t>
+            </a:r>
+            <a:r>
+              <a:rPr/>
+              <a:t>blue.</a:t>
+            </a:r>
+            <a:r>
+              <a:rPr/>
+              <a:t> </a:t>
+            </a:r>
+            <a:r>
+              <a:rPr/>
+              <a:t>There</a:t>
+            </a:r>
+            <a:r>
+              <a:rPr/>
+              <a:t> </a:t>
+            </a:r>
+            <a:r>
+              <a:rPr/>
+              <a:t>is</a:t>
+            </a:r>
+            <a:r>
+              <a:rPr/>
+              <a:t> </a:t>
+            </a:r>
+            <a:r>
+              <a:rPr/>
+              <a:t>some</a:t>
+            </a:r>
+            <a:r>
+              <a:rPr/>
+              <a:t> </a:t>
+            </a:r>
+            <a:r>
+              <a:rPr/>
+              <a:t>contrast</a:t>
+            </a:r>
+            <a:r>
+              <a:rPr/>
+              <a:t> </a:t>
+            </a:r>
+            <a:r>
+              <a:rPr/>
+              <a:t>here,</a:t>
+            </a:r>
+            <a:r>
+              <a:rPr/>
+              <a:t> </a:t>
+            </a:r>
+            <a:r>
+              <a:rPr/>
+              <a:t>but</a:t>
+            </a:r>
+            <a:r>
+              <a:rPr/>
+              <a:t> </a:t>
+            </a:r>
+            <a:r>
+              <a:rPr/>
+              <a:t>there</a:t>
+            </a:r>
+            <a:r>
+              <a:rPr/>
+              <a:t> </a:t>
+            </a:r>
+            <a:r>
+              <a:rPr/>
+              <a:t>is</a:t>
+            </a:r>
+            <a:r>
+              <a:rPr/>
+              <a:t> </a:t>
+            </a:r>
+            <a:r>
+              <a:rPr/>
+              <a:t>not</a:t>
+            </a:r>
+            <a:r>
+              <a:rPr/>
+              <a:t> </a:t>
+            </a:r>
+            <a:r>
+              <a:rPr/>
+              <a:t>a</a:t>
+            </a:r>
+            <a:r>
+              <a:rPr/>
+              <a:t> </a:t>
+            </a:r>
+            <a:r>
+              <a:rPr/>
+              <a:t>lot</a:t>
+            </a:r>
+            <a:r>
+              <a:rPr/>
+              <a:t> </a:t>
+            </a:r>
+            <a:r>
+              <a:rPr/>
+              <a:t>of</a:t>
+            </a:r>
+            <a:r>
+              <a:rPr/>
+              <a:t> </a:t>
+            </a:r>
+            <a:r>
+              <a:rPr/>
+              <a:t>variation</a:t>
+            </a:r>
+            <a:r>
+              <a:rPr/>
+              <a:t> </a:t>
+            </a:r>
+            <a:r>
+              <a:rPr/>
+              <a:t>in</a:t>
             </a:r>
             <a:r>
               <a:rPr/>
@@ -2632,311 +3378,7 @@
             </a:r>
             <a:r>
               <a:rPr/>
-              <a:t>principle</a:t>
-            </a:r>
-            <a:r>
-              <a:rPr/>
-              <a:t> </a:t>
-            </a:r>
-            <a:r>
-              <a:rPr/>
-              <a:t>of</a:t>
-            </a:r>
-            <a:r>
-              <a:rPr/>
-              <a:t> </a:t>
-            </a:r>
-            <a:r>
-              <a:rPr/>
-              <a:t>similarity,</a:t>
-            </a:r>
-            <a:r>
-              <a:rPr/>
-              <a:t> </a:t>
-            </a:r>
-            <a:r>
-              <a:rPr/>
-              <a:t>and</a:t>
-            </a:r>
-            <a:r>
-              <a:rPr/>
-              <a:t> </a:t>
-            </a:r>
-            <a:r>
-              <a:rPr/>
-              <a:t>there</a:t>
-            </a:r>
-            <a:r>
-              <a:rPr/>
-              <a:t> </a:t>
-            </a:r>
-            <a:r>
-              <a:rPr/>
-              <a:t>needs</a:t>
-            </a:r>
-            <a:r>
-              <a:rPr/>
-              <a:t> </a:t>
-            </a:r>
-            <a:r>
-              <a:rPr/>
-              <a:t>to</a:t>
-            </a:r>
-            <a:r>
-              <a:rPr/>
-              <a:t> </a:t>
-            </a:r>
-            <a:r>
-              <a:rPr/>
-              <a:t>be</a:t>
-            </a:r>
-            <a:r>
-              <a:rPr/>
-              <a:t> </a:t>
-            </a:r>
-            <a:r>
-              <a:rPr/>
-              <a:t>sufficient</a:t>
-            </a:r>
-            <a:r>
-              <a:rPr/>
-              <a:t> </a:t>
-            </a:r>
-            <a:r>
-              <a:rPr/>
-              <a:t>dissimilarity</a:t>
-            </a:r>
-            <a:r>
-              <a:rPr/>
-              <a:t> </a:t>
-            </a:r>
-            <a:r>
-              <a:rPr/>
-              <a:t>in</a:t>
-            </a:r>
-            <a:r>
-              <a:rPr/>
-              <a:t> </a:t>
-            </a:r>
-            <a:r>
-              <a:rPr/>
-              <a:t>the</a:t>
-            </a:r>
-            <a:r>
-              <a:rPr/>
-              <a:t> </a:t>
-            </a:r>
-            <a:r>
-              <a:rPr/>
-              <a:t>different</a:t>
-            </a:r>
-            <a:r>
-              <a:rPr/>
-              <a:t> </a:t>
-            </a:r>
-            <a:r>
-              <a:rPr/>
-              <a:t>symbols</a:t>
-            </a:r>
-            <a:r>
-              <a:rPr/>
-              <a:t> </a:t>
-            </a:r>
-            <a:r>
-              <a:rPr/>
-              <a:t>to</a:t>
-            </a:r>
-            <a:r>
-              <a:rPr/>
-              <a:t> </a:t>
-            </a:r>
-            <a:r>
-              <a:rPr/>
-              <a:t>make</a:t>
-            </a:r>
-            <a:r>
-              <a:rPr/>
-              <a:t> </a:t>
-            </a:r>
-            <a:r>
-              <a:rPr/>
-              <a:t>this</a:t>
-            </a:r>
-            <a:r>
-              <a:rPr/>
-              <a:t> </a:t>
-            </a:r>
-            <a:r>
-              <a:rPr/>
-              <a:t>work.</a:t>
-            </a:r>
-            <a:r>
-              <a:rPr/>
-              <a:t> </a:t>
-            </a:r>
-            <a:r>
-              <a:rPr/>
-              <a:t>A</a:t>
-            </a:r>
-            <a:r>
-              <a:rPr/>
-              <a:t> </a:t>
-            </a:r>
-            <a:r>
-              <a:rPr/>
-              <a:t>closed</a:t>
-            </a:r>
-            <a:r>
-              <a:rPr/>
-              <a:t> </a:t>
-            </a:r>
-            <a:r>
-              <a:rPr/>
-              <a:t>circle,</a:t>
-            </a:r>
-            <a:r>
-              <a:rPr/>
-              <a:t> </a:t>
-            </a:r>
-            <a:r>
-              <a:rPr/>
-              <a:t>a</a:t>
-            </a:r>
-            <a:r>
-              <a:rPr/>
-              <a:t> </a:t>
-            </a:r>
-            <a:r>
-              <a:rPr/>
-              <a:t>closed</a:t>
-            </a:r>
-            <a:r>
-              <a:rPr/>
-              <a:t> </a:t>
-            </a:r>
-            <a:r>
-              <a:rPr/>
-              <a:t>square,</a:t>
-            </a:r>
-            <a:r>
-              <a:rPr/>
-              <a:t> </a:t>
-            </a:r>
-            <a:r>
-              <a:rPr/>
-              <a:t>and</a:t>
-            </a:r>
-            <a:r>
-              <a:rPr/>
-              <a:t> </a:t>
-            </a:r>
-            <a:r>
-              <a:rPr/>
-              <a:t>a</a:t>
-            </a:r>
-            <a:r>
-              <a:rPr/>
-              <a:t> </a:t>
-            </a:r>
-            <a:r>
-              <a:rPr/>
-              <a:t>closed</a:t>
-            </a:r>
-            <a:r>
-              <a:rPr/>
-              <a:t> </a:t>
-            </a:r>
-            <a:r>
-              <a:rPr/>
-              <a:t>triangle</a:t>
-            </a:r>
-            <a:r>
-              <a:rPr/>
-              <a:t> </a:t>
-            </a:r>
-            <a:r>
-              <a:rPr/>
-              <a:t>all</a:t>
-            </a:r>
-            <a:r>
-              <a:rPr/>
-              <a:t> </a:t>
-            </a:r>
-            <a:r>
-              <a:rPr/>
-              <a:t>loop</a:t>
-            </a:r>
-            <a:r>
-              <a:rPr/>
-              <a:t> </a:t>
-            </a:r>
-            <a:r>
-              <a:rPr/>
-              <a:t>pretty</a:t>
-            </a:r>
-            <a:r>
-              <a:rPr/>
-              <a:t> </a:t>
-            </a:r>
-            <a:r>
-              <a:rPr/>
-              <a:t>much</a:t>
-            </a:r>
-            <a:r>
-              <a:rPr/>
-              <a:t> </a:t>
-            </a:r>
-            <a:r>
-              <a:rPr/>
-              <a:t>alike.</a:t>
-            </a:r>
-            <a:r>
-              <a:rPr/>
-              <a:t> </a:t>
-            </a:r>
-            <a:r>
-              <a:rPr/>
-              <a:t>How</a:t>
-            </a:r>
-            <a:r>
-              <a:rPr/>
-              <a:t> </a:t>
-            </a:r>
-            <a:r>
-              <a:rPr/>
-              <a:t>can</a:t>
-            </a:r>
-            <a:r>
-              <a:rPr/>
-              <a:t> </a:t>
-            </a:r>
-            <a:r>
-              <a:rPr/>
-              <a:t>you</a:t>
-            </a:r>
-            <a:r>
-              <a:rPr/>
-              <a:t> </a:t>
-            </a:r>
-            <a:r>
-              <a:rPr/>
-              <a:t>get</a:t>
-            </a:r>
-            <a:r>
-              <a:rPr/>
-              <a:t> </a:t>
-            </a:r>
-            <a:r>
-              <a:rPr/>
-              <a:t>more</a:t>
-            </a:r>
-            <a:r>
-              <a:rPr/>
-              <a:t> </a:t>
-            </a:r>
-            <a:r>
-              <a:rPr/>
-              <a:t>contrast?</a:t>
+              <a:t>brightness.</a:t>
             </a:r>
           </a:p>
         </p:txBody>
@@ -2958,7 +3400,7 @@
           <a:p>
             <a:fld id="{18BDFEC3-8487-43E8-A154-7C12CBC1FFF2}" type="slidenum">
               <a:rPr lang="en-US"/>
-              <a:t>9</a:t>
+              <a:t>8</a:t>
             </a:fld>
             <a:endParaRPr lang="en-US"/>
           </a:p>
@@ -3018,15 +3460,71 @@
             </a:pPr>
             <a:r>
               <a:rPr/>
-              <a:t>Connectedness</a:t>
-            </a:r>
-            <a:r>
-              <a:rPr/>
-              <a:t> </a:t>
-            </a:r>
-            <a:r>
-              <a:rPr/>
-              <a:t>provides</a:t>
+              <a:t>These</a:t>
+            </a:r>
+            <a:r>
+              <a:rPr/>
+              <a:t> </a:t>
+            </a:r>
+            <a:r>
+              <a:rPr/>
+              <a:t>colors</a:t>
+            </a:r>
+            <a:r>
+              <a:rPr/>
+              <a:t> </a:t>
+            </a:r>
+            <a:r>
+              <a:rPr/>
+              <a:t>differ</a:t>
+            </a:r>
+            <a:r>
+              <a:rPr/>
+              <a:t> </a:t>
+            </a:r>
+            <a:r>
+              <a:rPr/>
+              <a:t>in</a:t>
+            </a:r>
+            <a:r>
+              <a:rPr/>
+              <a:t> </a:t>
+            </a:r>
+            <a:r>
+              <a:rPr/>
+              <a:t>brightness,</a:t>
+            </a:r>
+            <a:r>
+              <a:rPr/>
+              <a:t> </a:t>
+            </a:r>
+            <a:r>
+              <a:rPr/>
+              <a:t>and</a:t>
+            </a:r>
+            <a:r>
+              <a:rPr/>
+              <a:t> </a:t>
+            </a:r>
+            <a:r>
+              <a:rPr/>
+              <a:t>provide</a:t>
+            </a:r>
+            <a:r>
+              <a:rPr/>
+              <a:t> </a:t>
+            </a:r>
+            <a:r>
+              <a:rPr/>
+              <a:t>more</a:t>
+            </a:r>
+            <a:r>
+              <a:rPr/>
+              <a:t> </a:t>
+            </a:r>
+            <a:r>
+              <a:rPr/>
+              <a:t>of</a:t>
             </a:r>
             <a:r>
               <a:rPr/>
@@ -3042,55 +3540,135 @@
             </a:r>
             <a:r>
               <a:rPr/>
-              <a:t>much</a:t>
-            </a:r>
-            <a:r>
-              <a:rPr/>
-              <a:t> </a:t>
-            </a:r>
-            <a:r>
-              <a:rPr/>
-              <a:t>stronger</a:t>
-            </a:r>
-            <a:r>
-              <a:rPr/>
-              <a:t> </a:t>
-            </a:r>
-            <a:r>
-              <a:rPr/>
-              <a:t>sense</a:t>
-            </a:r>
-            <a:r>
-              <a:rPr/>
-              <a:t> </a:t>
-            </a:r>
-            <a:r>
-              <a:rPr/>
-              <a:t>of</a:t>
-            </a:r>
-            <a:r>
-              <a:rPr/>
-              <a:t> </a:t>
-            </a:r>
-            <a:r>
-              <a:rPr/>
-              <a:t>gestalt</a:t>
-            </a:r>
-            <a:r>
-              <a:rPr/>
-              <a:t> </a:t>
-            </a:r>
-            <a:r>
-              <a:rPr/>
-              <a:t>than</a:t>
-            </a:r>
-            <a:r>
-              <a:rPr/>
-              <a:t> </a:t>
-            </a:r>
-            <a:r>
-              <a:rPr/>
-              <a:t>similarity.</a:t>
+              <a:t>contrast.</a:t>
+            </a:r>
+            <a:r>
+              <a:rPr/>
+              <a:t> </a:t>
+            </a:r>
+            <a:r>
+              <a:rPr/>
+              <a:t>There</a:t>
+            </a:r>
+            <a:r>
+              <a:rPr/>
+              <a:t> </a:t>
+            </a:r>
+            <a:r>
+              <a:rPr/>
+              <a:t>are</a:t>
+            </a:r>
+            <a:r>
+              <a:rPr/>
+              <a:t> </a:t>
+            </a:r>
+            <a:r>
+              <a:rPr/>
+              <a:t>times</a:t>
+            </a:r>
+            <a:r>
+              <a:rPr/>
+              <a:t> </a:t>
+            </a:r>
+            <a:r>
+              <a:rPr/>
+              <a:t>when</a:t>
+            </a:r>
+            <a:r>
+              <a:rPr/>
+              <a:t> </a:t>
+            </a:r>
+            <a:r>
+              <a:rPr/>
+              <a:t>you</a:t>
+            </a:r>
+            <a:r>
+              <a:rPr/>
+              <a:t> </a:t>
+            </a:r>
+            <a:r>
+              <a:rPr/>
+              <a:t>want</a:t>
+            </a:r>
+            <a:r>
+              <a:rPr/>
+              <a:t> </a:t>
+            </a:r>
+            <a:r>
+              <a:rPr/>
+              <a:t>this</a:t>
+            </a:r>
+            <a:r>
+              <a:rPr/>
+              <a:t> </a:t>
+            </a:r>
+            <a:r>
+              <a:rPr/>
+              <a:t>extra</a:t>
+            </a:r>
+            <a:r>
+              <a:rPr/>
+              <a:t> </a:t>
+            </a:r>
+            <a:r>
+              <a:rPr/>
+              <a:t>contrast,</a:t>
+            </a:r>
+            <a:r>
+              <a:rPr/>
+              <a:t> </a:t>
+            </a:r>
+            <a:r>
+              <a:rPr/>
+              <a:t>but</a:t>
+            </a:r>
+            <a:r>
+              <a:rPr/>
+              <a:t> </a:t>
+            </a:r>
+            <a:r>
+              <a:rPr/>
+              <a:t>there</a:t>
+            </a:r>
+            <a:r>
+              <a:rPr/>
+              <a:t> </a:t>
+            </a:r>
+            <a:r>
+              <a:rPr/>
+              <a:t>are</a:t>
+            </a:r>
+            <a:r>
+              <a:rPr/>
+              <a:t> </a:t>
+            </a:r>
+            <a:r>
+              <a:rPr/>
+              <a:t>times</a:t>
+            </a:r>
+            <a:r>
+              <a:rPr/>
+              <a:t> </a:t>
+            </a:r>
+            <a:r>
+              <a:rPr/>
+              <a:t>when</a:t>
+            </a:r>
+            <a:r>
+              <a:rPr/>
+              <a:t> </a:t>
+            </a:r>
+            <a:r>
+              <a:rPr/>
+              <a:t>you</a:t>
+            </a:r>
+            <a:r>
+              <a:rPr/>
+              <a:t> </a:t>
+            </a:r>
+            <a:r>
+              <a:rPr/>
+              <a:t>don’t.</a:t>
             </a:r>
           </a:p>
         </p:txBody>
@@ -3112,7 +3690,7 @@
           <a:p>
             <a:fld id="{18BDFEC3-8487-43E8-A154-7C12CBC1FFF2}" type="slidenum">
               <a:rPr lang="en-US"/>
-              <a:t>10</a:t>
+              <a:t>9</a:t>
             </a:fld>
             <a:endParaRPr lang="en-US"/>
           </a:p>
@@ -3172,325 +3750,15 @@
             </a:pPr>
             <a:r>
               <a:rPr/>
-              <a:t>By</a:t>
-            </a:r>
-            <a:r>
-              <a:rPr/>
-              <a:t> </a:t>
-            </a:r>
-            <a:r>
-              <a:rPr/>
-              <a:t>putting</a:t>
-            </a:r>
-            <a:r>
-              <a:rPr/>
-              <a:t> </a:t>
-            </a:r>
-            <a:r>
-              <a:rPr/>
-              <a:t>the</a:t>
-            </a:r>
-            <a:r>
-              <a:rPr/>
-              <a:t> </a:t>
-            </a:r>
-            <a:r>
-              <a:rPr/>
-              <a:t>labels</a:t>
-            </a:r>
-            <a:r>
-              <a:rPr/>
-              <a:t> </a:t>
-            </a:r>
-            <a:r>
-              <a:rPr/>
-              <a:t>directly</a:t>
-            </a:r>
-            <a:r>
-              <a:rPr/>
-              <a:t> </a:t>
-            </a:r>
-            <a:r>
-              <a:rPr/>
-              <a:t>on</a:t>
-            </a:r>
-            <a:r>
-              <a:rPr/>
-              <a:t> </a:t>
-            </a:r>
-            <a:r>
-              <a:rPr/>
-              <a:t>the</a:t>
-            </a:r>
-            <a:r>
-              <a:rPr/>
-              <a:t> </a:t>
-            </a:r>
-            <a:r>
-              <a:rPr/>
-              <a:t>graph,</a:t>
-            </a:r>
-            <a:r>
-              <a:rPr/>
-              <a:t> </a:t>
-            </a:r>
-            <a:r>
-              <a:rPr/>
-              <a:t>you</a:t>
-            </a:r>
-            <a:r>
-              <a:rPr/>
-              <a:t> </a:t>
-            </a:r>
-            <a:r>
-              <a:rPr/>
-              <a:t>minimize</a:t>
-            </a:r>
-            <a:r>
-              <a:rPr/>
-              <a:t> </a:t>
-            </a:r>
-            <a:r>
-              <a:rPr/>
-              <a:t>the</a:t>
-            </a:r>
-            <a:r>
-              <a:rPr/>
-              <a:t> </a:t>
-            </a:r>
-            <a:r>
-              <a:rPr/>
-              <a:t>distance</a:t>
-            </a:r>
-            <a:r>
-              <a:rPr/>
-              <a:t> </a:t>
-            </a:r>
-            <a:r>
-              <a:rPr/>
-              <a:t>that</a:t>
-            </a:r>
-            <a:r>
-              <a:rPr/>
-              <a:t> </a:t>
-            </a:r>
-            <a:r>
-              <a:rPr/>
-              <a:t>your</a:t>
-            </a:r>
-            <a:r>
-              <a:rPr/>
-              <a:t> </a:t>
-            </a:r>
-            <a:r>
-              <a:rPr/>
-              <a:t>eye</a:t>
-            </a:r>
-            <a:r>
-              <a:rPr/>
-              <a:t> </a:t>
-            </a:r>
-            <a:r>
-              <a:rPr/>
-              <a:t>has</a:t>
-            </a:r>
-            <a:r>
-              <a:rPr/>
-              <a:t> </a:t>
-            </a:r>
-            <a:r>
-              <a:rPr/>
-              <a:t>to</a:t>
-            </a:r>
-            <a:r>
-              <a:rPr/>
-              <a:t> </a:t>
-            </a:r>
-            <a:r>
-              <a:rPr/>
-              <a:t>travel.</a:t>
-            </a:r>
-            <a:r>
-              <a:rPr/>
-              <a:t> </a:t>
-            </a:r>
-            <a:r>
-              <a:rPr/>
-              <a:t>No</a:t>
-            </a:r>
-            <a:r>
-              <a:rPr/>
-              <a:t> </a:t>
-            </a:r>
-            <a:r>
-              <a:rPr/>
-              <a:t>more</a:t>
-            </a:r>
-            <a:r>
-              <a:rPr/>
-              <a:t> </a:t>
-            </a:r>
-            <a:r>
-              <a:rPr/>
-              <a:t>back</a:t>
-            </a:r>
-            <a:r>
-              <a:rPr/>
-              <a:t> </a:t>
-            </a:r>
-            <a:r>
-              <a:rPr/>
-              <a:t>and</a:t>
-            </a:r>
-            <a:r>
-              <a:rPr/>
-              <a:t> </a:t>
-            </a:r>
-            <a:r>
-              <a:rPr/>
-              <a:t>forth</a:t>
-            </a:r>
-            <a:r>
-              <a:rPr/>
-              <a:t> </a:t>
-            </a:r>
-            <a:r>
-              <a:rPr/>
-              <a:t>between</a:t>
-            </a:r>
-            <a:r>
-              <a:rPr/>
-              <a:t> </a:t>
-            </a:r>
-            <a:r>
-              <a:rPr/>
-              <a:t>the</a:t>
-            </a:r>
-            <a:r>
-              <a:rPr/>
-              <a:t> </a:t>
-            </a:r>
-            <a:r>
-              <a:rPr/>
-              <a:t>legend</a:t>
-            </a:r>
-            <a:r>
-              <a:rPr/>
-              <a:t> </a:t>
-            </a:r>
-            <a:r>
-              <a:rPr/>
-              <a:t>and</a:t>
-            </a:r>
-            <a:r>
-              <a:rPr/>
-              <a:t> </a:t>
-            </a:r>
-            <a:r>
-              <a:rPr/>
-              <a:t>the</a:t>
-            </a:r>
-            <a:r>
-              <a:rPr/>
-              <a:t> </a:t>
-            </a:r>
-            <a:r>
-              <a:rPr/>
-              <a:t>graph.</a:t>
-            </a:r>
-          </a:p>
-          <a:p>
-            <a:pPr lvl="0" marL="0" indent="0">
-              <a:buNone/>
-            </a:pPr>
-          </a:p>
-          <a:p>
-            <a:pPr lvl="0" marL="0" indent="0">
-              <a:buNone/>
-            </a:pPr>
-            <a:r>
-              <a:rPr/>
-              <a:t>You</a:t>
-            </a:r>
-            <a:r>
-              <a:rPr/>
-              <a:t> </a:t>
-            </a:r>
-            <a:r>
-              <a:rPr/>
-              <a:t>can</a:t>
-            </a:r>
-            <a:r>
-              <a:rPr/>
-              <a:t> </a:t>
-            </a:r>
-            <a:r>
-              <a:rPr/>
-              <a:t>improve</a:t>
-            </a:r>
-            <a:r>
-              <a:rPr/>
-              <a:t> </a:t>
-            </a:r>
-            <a:r>
-              <a:rPr/>
-              <a:t>further</a:t>
-            </a:r>
-            <a:r>
-              <a:rPr/>
-              <a:t> </a:t>
-            </a:r>
-            <a:r>
-              <a:rPr/>
-              <a:t>on</a:t>
-            </a:r>
-            <a:r>
-              <a:rPr/>
-              <a:t> </a:t>
-            </a:r>
-            <a:r>
-              <a:rPr/>
-              <a:t>these</a:t>
-            </a:r>
-            <a:r>
-              <a:rPr/>
-              <a:t> </a:t>
-            </a:r>
-            <a:r>
-              <a:rPr/>
-              <a:t>labels.</a:t>
-            </a:r>
-            <a:r>
-              <a:rPr/>
-              <a:t> </a:t>
-            </a:r>
-            <a:r>
-              <a:rPr/>
-              <a:t>You</a:t>
-            </a:r>
-            <a:r>
-              <a:rPr/>
-              <a:t> </a:t>
-            </a:r>
-            <a:r>
-              <a:rPr/>
-              <a:t>might</a:t>
-            </a:r>
-            <a:r>
-              <a:rPr/>
-              <a:t> </a:t>
-            </a:r>
-            <a:r>
-              <a:rPr/>
-              <a:t>have</a:t>
-            </a:r>
-            <a:r>
-              <a:rPr/>
-              <a:t> </a:t>
-            </a:r>
-            <a:r>
-              <a:rPr/>
-              <a:t>had</a:t>
+              <a:t>Connectedness</a:t>
+            </a:r>
+            <a:r>
+              <a:rPr/>
+              <a:t> </a:t>
+            </a:r>
+            <a:r>
+              <a:rPr/>
+              <a:t>provides</a:t>
             </a:r>
             <a:r>
               <a:rPr/>
@@ -3506,7 +3774,23 @@
             </a:r>
             <a:r>
               <a:rPr/>
-              <a:t>moment</a:t>
+              <a:t>much</a:t>
+            </a:r>
+            <a:r>
+              <a:rPr/>
+              <a:t> </a:t>
+            </a:r>
+            <a:r>
+              <a:rPr/>
+              <a:t>stronger</a:t>
+            </a:r>
+            <a:r>
+              <a:rPr/>
+              <a:t> </a:t>
+            </a:r>
+            <a:r>
+              <a:rPr/>
+              <a:t>sense</a:t>
             </a:r>
             <a:r>
               <a:rPr/>
@@ -3522,501 +3806,23 @@
             </a:r>
             <a:r>
               <a:rPr/>
-              <a:t>hesitation</a:t>
-            </a:r>
-            <a:r>
-              <a:rPr/>
-              <a:t> </a:t>
-            </a:r>
-            <a:r>
-              <a:rPr/>
-              <a:t>when</a:t>
-            </a:r>
-            <a:r>
-              <a:rPr/>
-              <a:t> </a:t>
-            </a:r>
-            <a:r>
-              <a:rPr/>
-              <a:t>you</a:t>
-            </a:r>
-            <a:r>
-              <a:rPr/>
-              <a:t> </a:t>
-            </a:r>
-            <a:r>
-              <a:rPr/>
-              <a:t>saw</a:t>
-            </a:r>
-            <a:r>
-              <a:rPr/>
-              <a:t> </a:t>
-            </a:r>
-            <a:r>
-              <a:rPr/>
-              <a:t>the</a:t>
-            </a:r>
-            <a:r>
-              <a:rPr/>
-              <a:t> </a:t>
-            </a:r>
-            <a:r>
-              <a:rPr/>
-              <a:t>label</a:t>
-            </a:r>
-            <a:r>
-              <a:rPr/>
-              <a:t> </a:t>
-            </a:r>
-            <a:r>
-              <a:rPr/>
-              <a:t>for</a:t>
-            </a:r>
-            <a:r>
-              <a:rPr/>
-              <a:t> </a:t>
-            </a:r>
-            <a:r>
-              <a:rPr/>
-              <a:t>Abel.</a:t>
-            </a:r>
-            <a:r>
-              <a:rPr/>
-              <a:t> </a:t>
-            </a:r>
-            <a:r>
-              <a:rPr/>
-              <a:t>Does</a:t>
-            </a:r>
-            <a:r>
-              <a:rPr/>
-              <a:t> </a:t>
-            </a:r>
-            <a:r>
-              <a:rPr/>
-              <a:t>it</a:t>
-            </a:r>
-            <a:r>
-              <a:rPr/>
-              <a:t> </a:t>
-            </a:r>
-            <a:r>
-              <a:rPr/>
-              <a:t>belong</a:t>
-            </a:r>
-            <a:r>
-              <a:rPr/>
-              <a:t> </a:t>
-            </a:r>
-            <a:r>
-              <a:rPr/>
-              <a:t>with</a:t>
-            </a:r>
-            <a:r>
-              <a:rPr/>
-              <a:t> </a:t>
-            </a:r>
-            <a:r>
-              <a:rPr/>
-              <a:t>the</a:t>
-            </a:r>
-            <a:r>
-              <a:rPr/>
-              <a:t> </a:t>
-            </a:r>
-            <a:r>
-              <a:rPr/>
-              <a:t>line</a:t>
-            </a:r>
-            <a:r>
-              <a:rPr/>
-              <a:t> </a:t>
-            </a:r>
-            <a:r>
-              <a:rPr/>
-              <a:t>just</a:t>
-            </a:r>
-            <a:r>
-              <a:rPr/>
-              <a:t> </a:t>
-            </a:r>
-            <a:r>
-              <a:rPr/>
-              <a:t>above</a:t>
-            </a:r>
-            <a:r>
-              <a:rPr/>
-              <a:t> </a:t>
-            </a:r>
-            <a:r>
-              <a:rPr/>
-              <a:t>or</a:t>
-            </a:r>
-            <a:r>
-              <a:rPr/>
-              <a:t> </a:t>
-            </a:r>
-            <a:r>
-              <a:rPr/>
-              <a:t>the</a:t>
-            </a:r>
-            <a:r>
-              <a:rPr/>
-              <a:t> </a:t>
-            </a:r>
-            <a:r>
-              <a:rPr/>
-              <a:t>line</a:t>
-            </a:r>
-            <a:r>
-              <a:rPr/>
-              <a:t> </a:t>
-            </a:r>
-            <a:r>
-              <a:rPr/>
-              <a:t>just</a:t>
-            </a:r>
-            <a:r>
-              <a:rPr/>
-              <a:t> </a:t>
-            </a:r>
-            <a:r>
-              <a:rPr/>
-              <a:t>below.</a:t>
-            </a:r>
-            <a:r>
-              <a:rPr/>
-              <a:t> </a:t>
-            </a:r>
-            <a:r>
-              <a:rPr/>
-              <a:t>It</a:t>
-            </a:r>
-            <a:r>
-              <a:rPr/>
-              <a:t> </a:t>
-            </a:r>
-            <a:r>
-              <a:rPr/>
-              <a:t>only</a:t>
-            </a:r>
-            <a:r>
-              <a:rPr/>
-              <a:t> </a:t>
-            </a:r>
-            <a:r>
-              <a:rPr/>
-              <a:t>slows</a:t>
-            </a:r>
-            <a:r>
-              <a:rPr/>
-              <a:t> </a:t>
-            </a:r>
-            <a:r>
-              <a:rPr/>
-              <a:t>you</a:t>
-            </a:r>
-            <a:r>
-              <a:rPr/>
-              <a:t> </a:t>
-            </a:r>
-            <a:r>
-              <a:rPr/>
-              <a:t>down</a:t>
-            </a:r>
-            <a:r>
-              <a:rPr/>
-              <a:t> </a:t>
-            </a:r>
-            <a:r>
-              <a:rPr/>
-              <a:t>for</a:t>
-            </a:r>
-            <a:r>
-              <a:rPr/>
-              <a:t> </a:t>
-            </a:r>
-            <a:r>
-              <a:rPr/>
-              <a:t>a</a:t>
-            </a:r>
-            <a:r>
-              <a:rPr/>
-              <a:t> </a:t>
-            </a:r>
-            <a:r>
-              <a:rPr/>
-              <a:t>second,</a:t>
-            </a:r>
-            <a:r>
-              <a:rPr/>
-              <a:t> </a:t>
-            </a:r>
-            <a:r>
-              <a:rPr/>
-              <a:t>because</a:t>
-            </a:r>
-            <a:r>
-              <a:rPr/>
-              <a:t> </a:t>
-            </a:r>
-            <a:r>
-              <a:rPr/>
-              <a:t>by</a:t>
-            </a:r>
-            <a:r>
-              <a:rPr/>
-              <a:t> </a:t>
-            </a:r>
-            <a:r>
-              <a:rPr/>
-              <a:t>process</a:t>
-            </a:r>
-            <a:r>
-              <a:rPr/>
-              <a:t> </a:t>
-            </a:r>
-            <a:r>
-              <a:rPr/>
-              <a:t>of</a:t>
-            </a:r>
-            <a:r>
-              <a:rPr/>
-              <a:t> </a:t>
-            </a:r>
-            <a:r>
-              <a:rPr/>
-              <a:t>elimination,</a:t>
-            </a:r>
-            <a:r>
-              <a:rPr/>
-              <a:t> </a:t>
-            </a:r>
-            <a:r>
-              <a:rPr/>
-              <a:t>you</a:t>
-            </a:r>
-            <a:r>
-              <a:rPr/>
-              <a:t> </a:t>
-            </a:r>
-            <a:r>
-              <a:rPr/>
-              <a:t>can</a:t>
-            </a:r>
-            <a:r>
-              <a:rPr/>
-              <a:t> </a:t>
-            </a:r>
-            <a:r>
-              <a:rPr/>
-              <a:t>quickly</a:t>
-            </a:r>
-            <a:r>
-              <a:rPr/>
-              <a:t> </a:t>
-            </a:r>
-            <a:r>
-              <a:rPr/>
-              <a:t>decide</a:t>
-            </a:r>
-            <a:r>
-              <a:rPr/>
-              <a:t> </a:t>
-            </a:r>
-            <a:r>
-              <a:rPr/>
-              <a:t>that</a:t>
-            </a:r>
-            <a:r>
-              <a:rPr/>
-              <a:t> </a:t>
-            </a:r>
-            <a:r>
-              <a:rPr/>
-              <a:t>it</a:t>
-            </a:r>
-            <a:r>
-              <a:rPr/>
-              <a:t> </a:t>
-            </a:r>
-            <a:r>
-              <a:rPr/>
-              <a:t>belongs</a:t>
-            </a:r>
-            <a:r>
-              <a:rPr/>
-              <a:t> </a:t>
-            </a:r>
-            <a:r>
-              <a:rPr/>
-              <a:t>with</a:t>
-            </a:r>
-            <a:r>
-              <a:rPr/>
-              <a:t> </a:t>
-            </a:r>
-            <a:r>
-              <a:rPr/>
-              <a:t>the</a:t>
-            </a:r>
-            <a:r>
-              <a:rPr/>
-              <a:t> </a:t>
-            </a:r>
-            <a:r>
-              <a:rPr/>
-              <a:t>line</a:t>
-            </a:r>
-            <a:r>
-              <a:rPr/>
-              <a:t> </a:t>
-            </a:r>
-            <a:r>
-              <a:rPr/>
-              <a:t>just</a:t>
-            </a:r>
-            <a:r>
-              <a:rPr/>
-              <a:t> </a:t>
-            </a:r>
-            <a:r>
-              <a:rPr/>
-              <a:t>below</a:t>
-            </a:r>
-            <a:r>
-              <a:rPr/>
-              <a:t> </a:t>
-            </a:r>
-            <a:r>
-              <a:rPr/>
-              <a:t>it.</a:t>
-            </a:r>
-          </a:p>
-          <a:p>
-            <a:pPr lvl="0" marL="0" indent="0">
-              <a:buNone/>
-            </a:pPr>
-          </a:p>
-          <a:p>
-            <a:pPr lvl="0" marL="0" indent="0">
-              <a:buNone/>
-            </a:pPr>
-            <a:r>
-              <a:rPr/>
-              <a:t>But</a:t>
-            </a:r>
-            <a:r>
-              <a:rPr/>
-              <a:t> </a:t>
-            </a:r>
-            <a:r>
-              <a:rPr/>
-              <a:t>you</a:t>
-            </a:r>
-            <a:r>
-              <a:rPr/>
-              <a:t> </a:t>
-            </a:r>
-            <a:r>
-              <a:rPr/>
-              <a:t>can</a:t>
-            </a:r>
-            <a:r>
-              <a:rPr/>
-              <a:t> </a:t>
-            </a:r>
-            <a:r>
-              <a:rPr/>
-              <a:t>improve</a:t>
-            </a:r>
-            <a:r>
-              <a:rPr/>
-              <a:t> </a:t>
-            </a:r>
-            <a:r>
-              <a:rPr/>
-              <a:t>the</a:t>
-            </a:r>
-            <a:r>
-              <a:rPr/>
-              <a:t> </a:t>
-            </a:r>
-            <a:r>
-              <a:rPr/>
-              <a:t>sense</a:t>
-            </a:r>
-            <a:r>
-              <a:rPr/>
-              <a:t> </a:t>
-            </a:r>
-            <a:r>
-              <a:rPr/>
-              <a:t>of</a:t>
-            </a:r>
-            <a:r>
-              <a:rPr/>
-              <a:t> </a:t>
-            </a:r>
-            <a:r>
-              <a:rPr/>
-              <a:t>belongingness</a:t>
-            </a:r>
-            <a:r>
-              <a:rPr/>
-              <a:t> </a:t>
-            </a:r>
-            <a:r>
-              <a:rPr/>
-              <a:t>by</a:t>
-            </a:r>
-            <a:r>
-              <a:rPr/>
-              <a:t> </a:t>
-            </a:r>
-            <a:r>
-              <a:rPr/>
-              <a:t>using</a:t>
-            </a:r>
-            <a:r>
-              <a:rPr/>
-              <a:t> </a:t>
-            </a:r>
-            <a:r>
-              <a:rPr/>
-              <a:t>some</a:t>
-            </a:r>
-            <a:r>
-              <a:rPr/>
-              <a:t> </a:t>
-            </a:r>
-            <a:r>
-              <a:rPr/>
-              <a:t>of</a:t>
-            </a:r>
-            <a:r>
-              <a:rPr/>
-              <a:t> </a:t>
-            </a:r>
-            <a:r>
-              <a:rPr/>
-              <a:t>your</a:t>
-            </a:r>
-            <a:r>
-              <a:rPr/>
-              <a:t> </a:t>
-            </a:r>
-            <a:r>
-              <a:rPr/>
-              <a:t>Gestalt</a:t>
-            </a:r>
-            <a:r>
-              <a:rPr/>
-              <a:t> </a:t>
-            </a:r>
-            <a:r>
-              <a:rPr/>
-              <a:t>principles.</a:t>
+              <a:t>gestalt</a:t>
+            </a:r>
+            <a:r>
+              <a:rPr/>
+              <a:t> </a:t>
+            </a:r>
+            <a:r>
+              <a:rPr/>
+              <a:t>than</a:t>
+            </a:r>
+            <a:r>
+              <a:rPr/>
+              <a:t> </a:t>
+            </a:r>
+            <a:r>
+              <a:rPr/>
+              <a:t>similarity.</a:t>
             </a:r>
           </a:p>
         </p:txBody>
@@ -4038,7 +3844,7 @@
           <a:p>
             <a:fld id="{18BDFEC3-8487-43E8-A154-7C12CBC1FFF2}" type="slidenum">
               <a:rPr lang="en-US"/>
-              <a:t>14</a:t>
+              <a:t>10</a:t>
             </a:fld>
             <a:endParaRPr lang="en-US"/>
           </a:p>
@@ -4098,15 +3904,15 @@
             </a:pPr>
             <a:r>
               <a:rPr/>
-              <a:t>Notice</a:t>
-            </a:r>
-            <a:r>
-              <a:rPr/>
-              <a:t> </a:t>
-            </a:r>
-            <a:r>
-              <a:rPr/>
-              <a:t>how</a:t>
+              <a:t>By</a:t>
+            </a:r>
+            <a:r>
+              <a:rPr/>
+              <a:t> </a:t>
+            </a:r>
+            <a:r>
+              <a:rPr/>
+              <a:t>putting</a:t>
             </a:r>
             <a:r>
               <a:rPr/>
@@ -4130,23 +3936,277 @@
             </a:r>
             <a:r>
               <a:rPr/>
-              <a:t>in</a:t>
-            </a:r>
-            <a:r>
-              <a:rPr/>
-              <a:t> </a:t>
-            </a:r>
-            <a:r>
-              <a:rPr/>
-              <a:t>this</a:t>
-            </a:r>
-            <a:r>
-              <a:rPr/>
-              <a:t> </a:t>
-            </a:r>
-            <a:r>
-              <a:rPr/>
-              <a:t>example</a:t>
+              <a:t>directly</a:t>
+            </a:r>
+            <a:r>
+              <a:rPr/>
+              <a:t> </a:t>
+            </a:r>
+            <a:r>
+              <a:rPr/>
+              <a:t>on</a:t>
+            </a:r>
+            <a:r>
+              <a:rPr/>
+              <a:t> </a:t>
+            </a:r>
+            <a:r>
+              <a:rPr/>
+              <a:t>the</a:t>
+            </a:r>
+            <a:r>
+              <a:rPr/>
+              <a:t> </a:t>
+            </a:r>
+            <a:r>
+              <a:rPr/>
+              <a:t>graph,</a:t>
+            </a:r>
+            <a:r>
+              <a:rPr/>
+              <a:t> </a:t>
+            </a:r>
+            <a:r>
+              <a:rPr/>
+              <a:t>you</a:t>
+            </a:r>
+            <a:r>
+              <a:rPr/>
+              <a:t> </a:t>
+            </a:r>
+            <a:r>
+              <a:rPr/>
+              <a:t>minimize</a:t>
+            </a:r>
+            <a:r>
+              <a:rPr/>
+              <a:t> </a:t>
+            </a:r>
+            <a:r>
+              <a:rPr/>
+              <a:t>the</a:t>
+            </a:r>
+            <a:r>
+              <a:rPr/>
+              <a:t> </a:t>
+            </a:r>
+            <a:r>
+              <a:rPr/>
+              <a:t>distance</a:t>
+            </a:r>
+            <a:r>
+              <a:rPr/>
+              <a:t> </a:t>
+            </a:r>
+            <a:r>
+              <a:rPr/>
+              <a:t>that</a:t>
+            </a:r>
+            <a:r>
+              <a:rPr/>
+              <a:t> </a:t>
+            </a:r>
+            <a:r>
+              <a:rPr/>
+              <a:t>your</a:t>
+            </a:r>
+            <a:r>
+              <a:rPr/>
+              <a:t> </a:t>
+            </a:r>
+            <a:r>
+              <a:rPr/>
+              <a:t>eye</a:t>
+            </a:r>
+            <a:r>
+              <a:rPr/>
+              <a:t> </a:t>
+            </a:r>
+            <a:r>
+              <a:rPr/>
+              <a:t>has</a:t>
+            </a:r>
+            <a:r>
+              <a:rPr/>
+              <a:t> </a:t>
+            </a:r>
+            <a:r>
+              <a:rPr/>
+              <a:t>to</a:t>
+            </a:r>
+            <a:r>
+              <a:rPr/>
+              <a:t> </a:t>
+            </a:r>
+            <a:r>
+              <a:rPr/>
+              <a:t>travel.</a:t>
+            </a:r>
+            <a:r>
+              <a:rPr/>
+              <a:t> </a:t>
+            </a:r>
+            <a:r>
+              <a:rPr/>
+              <a:t>No</a:t>
+            </a:r>
+            <a:r>
+              <a:rPr/>
+              <a:t> </a:t>
+            </a:r>
+            <a:r>
+              <a:rPr/>
+              <a:t>more</a:t>
+            </a:r>
+            <a:r>
+              <a:rPr/>
+              <a:t> </a:t>
+            </a:r>
+            <a:r>
+              <a:rPr/>
+              <a:t>back</a:t>
+            </a:r>
+            <a:r>
+              <a:rPr/>
+              <a:t> </a:t>
+            </a:r>
+            <a:r>
+              <a:rPr/>
+              <a:t>and</a:t>
+            </a:r>
+            <a:r>
+              <a:rPr/>
+              <a:t> </a:t>
+            </a:r>
+            <a:r>
+              <a:rPr/>
+              <a:t>forth</a:t>
+            </a:r>
+            <a:r>
+              <a:rPr/>
+              <a:t> </a:t>
+            </a:r>
+            <a:r>
+              <a:rPr/>
+              <a:t>between</a:t>
+            </a:r>
+            <a:r>
+              <a:rPr/>
+              <a:t> </a:t>
+            </a:r>
+            <a:r>
+              <a:rPr/>
+              <a:t>the</a:t>
+            </a:r>
+            <a:r>
+              <a:rPr/>
+              <a:t> </a:t>
+            </a:r>
+            <a:r>
+              <a:rPr/>
+              <a:t>legend</a:t>
+            </a:r>
+            <a:r>
+              <a:rPr/>
+              <a:t> </a:t>
+            </a:r>
+            <a:r>
+              <a:rPr/>
+              <a:t>and</a:t>
+            </a:r>
+            <a:r>
+              <a:rPr/>
+              <a:t> </a:t>
+            </a:r>
+            <a:r>
+              <a:rPr/>
+              <a:t>the</a:t>
+            </a:r>
+            <a:r>
+              <a:rPr/>
+              <a:t> </a:t>
+            </a:r>
+            <a:r>
+              <a:rPr/>
+              <a:t>graph.</a:t>
+            </a:r>
+          </a:p>
+          <a:p>
+            <a:pPr lvl="0" marL="0" indent="0">
+              <a:buNone/>
+            </a:pPr>
+          </a:p>
+          <a:p>
+            <a:pPr lvl="0" marL="0" indent="0">
+              <a:buNone/>
+            </a:pPr>
+            <a:r>
+              <a:rPr/>
+              <a:t>You</a:t>
+            </a:r>
+            <a:r>
+              <a:rPr/>
+              <a:t> </a:t>
+            </a:r>
+            <a:r>
+              <a:rPr/>
+              <a:t>can</a:t>
+            </a:r>
+            <a:r>
+              <a:rPr/>
+              <a:t> </a:t>
+            </a:r>
+            <a:r>
+              <a:rPr/>
+              <a:t>improve</a:t>
+            </a:r>
+            <a:r>
+              <a:rPr/>
+              <a:t> </a:t>
+            </a:r>
+            <a:r>
+              <a:rPr/>
+              <a:t>further</a:t>
+            </a:r>
+            <a:r>
+              <a:rPr/>
+              <a:t> </a:t>
+            </a:r>
+            <a:r>
+              <a:rPr/>
+              <a:t>on</a:t>
+            </a:r>
+            <a:r>
+              <a:rPr/>
+              <a:t> </a:t>
+            </a:r>
+            <a:r>
+              <a:rPr/>
+              <a:t>these</a:t>
+            </a:r>
+            <a:r>
+              <a:rPr/>
+              <a:t> </a:t>
+            </a:r>
+            <a:r>
+              <a:rPr/>
+              <a:t>labels.</a:t>
+            </a:r>
+            <a:r>
+              <a:rPr/>
+              <a:t> </a:t>
+            </a:r>
+            <a:r>
+              <a:rPr/>
+              <a:t>You</a:t>
+            </a:r>
+            <a:r>
+              <a:rPr/>
+              <a:t> </a:t>
+            </a:r>
+            <a:r>
+              <a:rPr/>
+              <a:t>might</a:t>
             </a:r>
             <a:r>
               <a:rPr/>
@@ -4162,31 +4222,63 @@
             </a:r>
             <a:r>
               <a:rPr/>
-              <a:t>been</a:t>
-            </a:r>
-            <a:r>
-              <a:rPr/>
-              <a:t> </a:t>
-            </a:r>
-            <a:r>
-              <a:rPr/>
-              <a:t>moved</a:t>
-            </a:r>
-            <a:r>
-              <a:rPr/>
-              <a:t> </a:t>
-            </a:r>
-            <a:r>
-              <a:rPr/>
-              <a:t>closer</a:t>
-            </a:r>
-            <a:r>
-              <a:rPr/>
-              <a:t> </a:t>
-            </a:r>
-            <a:r>
-              <a:rPr/>
-              <a:t>to</a:t>
+              <a:t>had</a:t>
+            </a:r>
+            <a:r>
+              <a:rPr/>
+              <a:t> </a:t>
+            </a:r>
+            <a:r>
+              <a:rPr/>
+              <a:t>a</a:t>
+            </a:r>
+            <a:r>
+              <a:rPr/>
+              <a:t> </a:t>
+            </a:r>
+            <a:r>
+              <a:rPr/>
+              <a:t>moment</a:t>
+            </a:r>
+            <a:r>
+              <a:rPr/>
+              <a:t> </a:t>
+            </a:r>
+            <a:r>
+              <a:rPr/>
+              <a:t>of</a:t>
+            </a:r>
+            <a:r>
+              <a:rPr/>
+              <a:t> </a:t>
+            </a:r>
+            <a:r>
+              <a:rPr/>
+              <a:t>hesitation</a:t>
+            </a:r>
+            <a:r>
+              <a:rPr/>
+              <a:t> </a:t>
+            </a:r>
+            <a:r>
+              <a:rPr/>
+              <a:t>when</a:t>
+            </a:r>
+            <a:r>
+              <a:rPr/>
+              <a:t> </a:t>
+            </a:r>
+            <a:r>
+              <a:rPr/>
+              <a:t>you</a:t>
+            </a:r>
+            <a:r>
+              <a:rPr/>
+              <a:t> </a:t>
+            </a:r>
+            <a:r>
+              <a:rPr/>
+              <a:t>saw</a:t>
             </a:r>
             <a:r>
               <a:rPr/>
@@ -4202,23 +4294,55 @@
             </a:r>
             <a:r>
               <a:rPr/>
-              <a:t>lines.</a:t>
-            </a:r>
-            <a:r>
-              <a:rPr/>
-              <a:t> </a:t>
-            </a:r>
-            <a:r>
-              <a:rPr/>
-              <a:t>The</a:t>
-            </a:r>
-            <a:r>
-              <a:rPr/>
-              <a:t> </a:t>
-            </a:r>
-            <a:r>
-              <a:rPr/>
-              <a:t>exploits</a:t>
+              <a:t>label</a:t>
+            </a:r>
+            <a:r>
+              <a:rPr/>
+              <a:t> </a:t>
+            </a:r>
+            <a:r>
+              <a:rPr/>
+              <a:t>for</a:t>
+            </a:r>
+            <a:r>
+              <a:rPr/>
+              <a:t> </a:t>
+            </a:r>
+            <a:r>
+              <a:rPr/>
+              <a:t>Abel.</a:t>
+            </a:r>
+            <a:r>
+              <a:rPr/>
+              <a:t> </a:t>
+            </a:r>
+            <a:r>
+              <a:rPr/>
+              <a:t>Does</a:t>
+            </a:r>
+            <a:r>
+              <a:rPr/>
+              <a:t> </a:t>
+            </a:r>
+            <a:r>
+              <a:rPr/>
+              <a:t>it</a:t>
+            </a:r>
+            <a:r>
+              <a:rPr/>
+              <a:t> </a:t>
+            </a:r>
+            <a:r>
+              <a:rPr/>
+              <a:t>belong</a:t>
+            </a:r>
+            <a:r>
+              <a:rPr/>
+              <a:t> </a:t>
+            </a:r>
+            <a:r>
+              <a:rPr/>
+              <a:t>with</a:t>
             </a:r>
             <a:r>
               <a:rPr/>
@@ -4234,6 +4358,388 @@
             </a:r>
             <a:r>
               <a:rPr/>
+              <a:t>line</a:t>
+            </a:r>
+            <a:r>
+              <a:rPr/>
+              <a:t> </a:t>
+            </a:r>
+            <a:r>
+              <a:rPr/>
+              <a:t>just</a:t>
+            </a:r>
+            <a:r>
+              <a:rPr/>
+              <a:t> </a:t>
+            </a:r>
+            <a:r>
+              <a:rPr/>
+              <a:t>above</a:t>
+            </a:r>
+            <a:r>
+              <a:rPr/>
+              <a:t> </a:t>
+            </a:r>
+            <a:r>
+              <a:rPr/>
+              <a:t>or</a:t>
+            </a:r>
+            <a:r>
+              <a:rPr/>
+              <a:t> </a:t>
+            </a:r>
+            <a:r>
+              <a:rPr/>
+              <a:t>the</a:t>
+            </a:r>
+            <a:r>
+              <a:rPr/>
+              <a:t> </a:t>
+            </a:r>
+            <a:r>
+              <a:rPr/>
+              <a:t>line</a:t>
+            </a:r>
+            <a:r>
+              <a:rPr/>
+              <a:t> </a:t>
+            </a:r>
+            <a:r>
+              <a:rPr/>
+              <a:t>just</a:t>
+            </a:r>
+            <a:r>
+              <a:rPr/>
+              <a:t> </a:t>
+            </a:r>
+            <a:r>
+              <a:rPr/>
+              <a:t>below.</a:t>
+            </a:r>
+            <a:r>
+              <a:rPr/>
+              <a:t> </a:t>
+            </a:r>
+            <a:r>
+              <a:rPr/>
+              <a:t>It</a:t>
+            </a:r>
+            <a:r>
+              <a:rPr/>
+              <a:t> </a:t>
+            </a:r>
+            <a:r>
+              <a:rPr/>
+              <a:t>only</a:t>
+            </a:r>
+            <a:r>
+              <a:rPr/>
+              <a:t> </a:t>
+            </a:r>
+            <a:r>
+              <a:rPr/>
+              <a:t>slows</a:t>
+            </a:r>
+            <a:r>
+              <a:rPr/>
+              <a:t> </a:t>
+            </a:r>
+            <a:r>
+              <a:rPr/>
+              <a:t>you</a:t>
+            </a:r>
+            <a:r>
+              <a:rPr/>
+              <a:t> </a:t>
+            </a:r>
+            <a:r>
+              <a:rPr/>
+              <a:t>down</a:t>
+            </a:r>
+            <a:r>
+              <a:rPr/>
+              <a:t> </a:t>
+            </a:r>
+            <a:r>
+              <a:rPr/>
+              <a:t>for</a:t>
+            </a:r>
+            <a:r>
+              <a:rPr/>
+              <a:t> </a:t>
+            </a:r>
+            <a:r>
+              <a:rPr/>
+              <a:t>a</a:t>
+            </a:r>
+            <a:r>
+              <a:rPr/>
+              <a:t> </a:t>
+            </a:r>
+            <a:r>
+              <a:rPr/>
+              <a:t>second,</a:t>
+            </a:r>
+            <a:r>
+              <a:rPr/>
+              <a:t> </a:t>
+            </a:r>
+            <a:r>
+              <a:rPr/>
+              <a:t>because</a:t>
+            </a:r>
+            <a:r>
+              <a:rPr/>
+              <a:t> </a:t>
+            </a:r>
+            <a:r>
+              <a:rPr/>
+              <a:t>by</a:t>
+            </a:r>
+            <a:r>
+              <a:rPr/>
+              <a:t> </a:t>
+            </a:r>
+            <a:r>
+              <a:rPr/>
+              <a:t>process</a:t>
+            </a:r>
+            <a:r>
+              <a:rPr/>
+              <a:t> </a:t>
+            </a:r>
+            <a:r>
+              <a:rPr/>
+              <a:t>of</a:t>
+            </a:r>
+            <a:r>
+              <a:rPr/>
+              <a:t> </a:t>
+            </a:r>
+            <a:r>
+              <a:rPr/>
+              <a:t>elimination,</a:t>
+            </a:r>
+            <a:r>
+              <a:rPr/>
+              <a:t> </a:t>
+            </a:r>
+            <a:r>
+              <a:rPr/>
+              <a:t>you</a:t>
+            </a:r>
+            <a:r>
+              <a:rPr/>
+              <a:t> </a:t>
+            </a:r>
+            <a:r>
+              <a:rPr/>
+              <a:t>can</a:t>
+            </a:r>
+            <a:r>
+              <a:rPr/>
+              <a:t> </a:t>
+            </a:r>
+            <a:r>
+              <a:rPr/>
+              <a:t>quickly</a:t>
+            </a:r>
+            <a:r>
+              <a:rPr/>
+              <a:t> </a:t>
+            </a:r>
+            <a:r>
+              <a:rPr/>
+              <a:t>decide</a:t>
+            </a:r>
+            <a:r>
+              <a:rPr/>
+              <a:t> </a:t>
+            </a:r>
+            <a:r>
+              <a:rPr/>
+              <a:t>that</a:t>
+            </a:r>
+            <a:r>
+              <a:rPr/>
+              <a:t> </a:t>
+            </a:r>
+            <a:r>
+              <a:rPr/>
+              <a:t>it</a:t>
+            </a:r>
+            <a:r>
+              <a:rPr/>
+              <a:t> </a:t>
+            </a:r>
+            <a:r>
+              <a:rPr/>
+              <a:t>belongs</a:t>
+            </a:r>
+            <a:r>
+              <a:rPr/>
+              <a:t> </a:t>
+            </a:r>
+            <a:r>
+              <a:rPr/>
+              <a:t>with</a:t>
+            </a:r>
+            <a:r>
+              <a:rPr/>
+              <a:t> </a:t>
+            </a:r>
+            <a:r>
+              <a:rPr/>
+              <a:t>the</a:t>
+            </a:r>
+            <a:r>
+              <a:rPr/>
+              <a:t> </a:t>
+            </a:r>
+            <a:r>
+              <a:rPr/>
+              <a:t>line</a:t>
+            </a:r>
+            <a:r>
+              <a:rPr/>
+              <a:t> </a:t>
+            </a:r>
+            <a:r>
+              <a:rPr/>
+              <a:t>just</a:t>
+            </a:r>
+            <a:r>
+              <a:rPr/>
+              <a:t> </a:t>
+            </a:r>
+            <a:r>
+              <a:rPr/>
+              <a:t>below</a:t>
+            </a:r>
+            <a:r>
+              <a:rPr/>
+              <a:t> </a:t>
+            </a:r>
+            <a:r>
+              <a:rPr/>
+              <a:t>it.</a:t>
+            </a:r>
+          </a:p>
+          <a:p>
+            <a:pPr lvl="0" marL="0" indent="0">
+              <a:buNone/>
+            </a:pPr>
+          </a:p>
+          <a:p>
+            <a:pPr lvl="0" marL="0" indent="0">
+              <a:buNone/>
+            </a:pPr>
+            <a:r>
+              <a:rPr/>
+              <a:t>But</a:t>
+            </a:r>
+            <a:r>
+              <a:rPr/>
+              <a:t> </a:t>
+            </a:r>
+            <a:r>
+              <a:rPr/>
+              <a:t>you</a:t>
+            </a:r>
+            <a:r>
+              <a:rPr/>
+              <a:t> </a:t>
+            </a:r>
+            <a:r>
+              <a:rPr/>
+              <a:t>can</a:t>
+            </a:r>
+            <a:r>
+              <a:rPr/>
+              <a:t> </a:t>
+            </a:r>
+            <a:r>
+              <a:rPr/>
+              <a:t>improve</a:t>
+            </a:r>
+            <a:r>
+              <a:rPr/>
+              <a:t> </a:t>
+            </a:r>
+            <a:r>
+              <a:rPr/>
+              <a:t>the</a:t>
+            </a:r>
+            <a:r>
+              <a:rPr/>
+              <a:t> </a:t>
+            </a:r>
+            <a:r>
+              <a:rPr/>
+              <a:t>sense</a:t>
+            </a:r>
+            <a:r>
+              <a:rPr/>
+              <a:t> </a:t>
+            </a:r>
+            <a:r>
+              <a:rPr/>
+              <a:t>of</a:t>
+            </a:r>
+            <a:r>
+              <a:rPr/>
+              <a:t> </a:t>
+            </a:r>
+            <a:r>
+              <a:rPr/>
+              <a:t>belongingness</a:t>
+            </a:r>
+            <a:r>
+              <a:rPr/>
+              <a:t> </a:t>
+            </a:r>
+            <a:r>
+              <a:rPr/>
+              <a:t>by</a:t>
+            </a:r>
+            <a:r>
+              <a:rPr/>
+              <a:t> </a:t>
+            </a:r>
+            <a:r>
+              <a:rPr/>
+              <a:t>using</a:t>
+            </a:r>
+            <a:r>
+              <a:rPr/>
+              <a:t> </a:t>
+            </a:r>
+            <a:r>
+              <a:rPr/>
+              <a:t>some</a:t>
+            </a:r>
+            <a:r>
+              <a:rPr/>
+              <a:t> </a:t>
+            </a:r>
+            <a:r>
+              <a:rPr/>
+              <a:t>of</a:t>
+            </a:r>
+            <a:r>
+              <a:rPr/>
+              <a:t> </a:t>
+            </a:r>
+            <a:r>
+              <a:rPr/>
+              <a:t>your</a:t>
+            </a:r>
+            <a:r>
+              <a:rPr/>
+              <a:t> </a:t>
+            </a:r>
+            <a:r>
+              <a:rPr/>
               <a:t>Gestalt</a:t>
             </a:r>
             <a:r>
@@ -4242,519 +4748,7 @@
             </a:r>
             <a:r>
               <a:rPr/>
-              <a:t>principle</a:t>
-            </a:r>
-            <a:r>
-              <a:rPr/>
-              <a:t> </a:t>
-            </a:r>
-            <a:r>
-              <a:rPr/>
-              <a:t>of</a:t>
-            </a:r>
-            <a:r>
-              <a:rPr/>
-              <a:t> </a:t>
-            </a:r>
-            <a:r>
-              <a:rPr/>
-              <a:t>proximity.</a:t>
-            </a:r>
-            <a:r>
-              <a:rPr/>
-              <a:t> </a:t>
-            </a:r>
-            <a:r>
-              <a:rPr/>
-              <a:t>Notice</a:t>
-            </a:r>
-            <a:r>
-              <a:rPr/>
-              <a:t> </a:t>
-            </a:r>
-            <a:r>
-              <a:rPr/>
-              <a:t>how</a:t>
-            </a:r>
-            <a:r>
-              <a:rPr/>
-              <a:t> </a:t>
-            </a:r>
-            <a:r>
-              <a:rPr/>
-              <a:t>the</a:t>
-            </a:r>
-            <a:r>
-              <a:rPr/>
-              <a:t> </a:t>
-            </a:r>
-            <a:r>
-              <a:rPr/>
-              <a:t>names</a:t>
-            </a:r>
-            <a:r>
-              <a:rPr/>
-              <a:t> </a:t>
-            </a:r>
-            <a:r>
-              <a:rPr/>
-              <a:t>have</a:t>
-            </a:r>
-            <a:r>
-              <a:rPr/>
-              <a:t> </a:t>
-            </a:r>
-            <a:r>
-              <a:rPr/>
-              <a:t>the</a:t>
-            </a:r>
-            <a:r>
-              <a:rPr/>
-              <a:t> </a:t>
-            </a:r>
-            <a:r>
-              <a:rPr/>
-              <a:t>same</a:t>
-            </a:r>
-            <a:r>
-              <a:rPr/>
-              <a:t> </a:t>
-            </a:r>
-            <a:r>
-              <a:rPr/>
-              <a:t>colors</a:t>
-            </a:r>
-            <a:r>
-              <a:rPr/>
-              <a:t> </a:t>
-            </a:r>
-            <a:r>
-              <a:rPr/>
-              <a:t>as</a:t>
-            </a:r>
-            <a:r>
-              <a:rPr/>
-              <a:t> </a:t>
-            </a:r>
-            <a:r>
-              <a:rPr/>
-              <a:t>the</a:t>
-            </a:r>
-            <a:r>
-              <a:rPr/>
-              <a:t> </a:t>
-            </a:r>
-            <a:r>
-              <a:rPr/>
-              <a:t>lines.</a:t>
-            </a:r>
-            <a:r>
-              <a:rPr/>
-              <a:t> </a:t>
-            </a:r>
-            <a:r>
-              <a:rPr/>
-              <a:t>Thie</a:t>
-            </a:r>
-            <a:r>
-              <a:rPr/>
-              <a:t> </a:t>
-            </a:r>
-            <a:r>
-              <a:rPr/>
-              <a:t>exploits</a:t>
-            </a:r>
-            <a:r>
-              <a:rPr/>
-              <a:t> </a:t>
-            </a:r>
-            <a:r>
-              <a:rPr/>
-              <a:t>the</a:t>
-            </a:r>
-            <a:r>
-              <a:rPr/>
-              <a:t> </a:t>
-            </a:r>
-            <a:r>
-              <a:rPr/>
-              <a:t>Gestalt</a:t>
-            </a:r>
-            <a:r>
-              <a:rPr/>
-              <a:t> </a:t>
-            </a:r>
-            <a:r>
-              <a:rPr/>
-              <a:t>principle</a:t>
-            </a:r>
-            <a:r>
-              <a:rPr/>
-              <a:t> </a:t>
-            </a:r>
-            <a:r>
-              <a:rPr/>
-              <a:t>of</a:t>
-            </a:r>
-            <a:r>
-              <a:rPr/>
-              <a:t> </a:t>
-            </a:r>
-            <a:r>
-              <a:rPr/>
-              <a:t>similarity.</a:t>
-            </a:r>
-            <a:r>
-              <a:rPr/>
-              <a:t> </a:t>
-            </a:r>
-            <a:r>
-              <a:rPr/>
-              <a:t>It</a:t>
-            </a:r>
-            <a:r>
-              <a:rPr/>
-              <a:t> </a:t>
-            </a:r>
-            <a:r>
-              <a:rPr/>
-              <a:t>would</a:t>
-            </a:r>
-            <a:r>
-              <a:rPr/>
-              <a:t> </a:t>
-            </a:r>
-            <a:r>
-              <a:rPr/>
-              <a:t>be</a:t>
-            </a:r>
-            <a:r>
-              <a:rPr/>
-              <a:t> </a:t>
-            </a:r>
-            <a:r>
-              <a:rPr/>
-              <a:t>very</a:t>
-            </a:r>
-            <a:r>
-              <a:rPr/>
-              <a:t> </a:t>
-            </a:r>
-            <a:r>
-              <a:rPr/>
-              <a:t>hard</a:t>
-            </a:r>
-            <a:r>
-              <a:rPr/>
-              <a:t> </a:t>
-            </a:r>
-            <a:r>
-              <a:rPr/>
-              <a:t>to</a:t>
-            </a:r>
-            <a:r>
-              <a:rPr/>
-              <a:t> </a:t>
-            </a:r>
-            <a:r>
-              <a:rPr/>
-              <a:t>incorrectly</a:t>
-            </a:r>
-            <a:r>
-              <a:rPr/>
-              <a:t> </a:t>
-            </a:r>
-            <a:r>
-              <a:rPr/>
-              <a:t>assign</a:t>
-            </a:r>
-            <a:r>
-              <a:rPr/>
-              <a:t> </a:t>
-            </a:r>
-            <a:r>
-              <a:rPr/>
-              <a:t>the</a:t>
-            </a:r>
-            <a:r>
-              <a:rPr/>
-              <a:t> </a:t>
-            </a:r>
-            <a:r>
-              <a:rPr/>
-              <a:t>red</a:t>
-            </a:r>
-            <a:r>
-              <a:rPr/>
-              <a:t> </a:t>
-            </a:r>
-            <a:r>
-              <a:rPr/>
-              <a:t>label</a:t>
-            </a:r>
-            <a:r>
-              <a:rPr/>
-              <a:t> </a:t>
-            </a:r>
-            <a:r>
-              <a:rPr/>
-              <a:t>of</a:t>
-            </a:r>
-            <a:r>
-              <a:rPr/>
-              <a:t> </a:t>
-            </a:r>
-            <a:r>
-              <a:rPr/>
-              <a:t>Abel</a:t>
-            </a:r>
-            <a:r>
-              <a:rPr/>
-              <a:t> </a:t>
-            </a:r>
-            <a:r>
-              <a:rPr/>
-              <a:t>with</a:t>
-            </a:r>
-            <a:r>
-              <a:rPr/>
-              <a:t> </a:t>
-            </a:r>
-            <a:r>
-              <a:rPr/>
-              <a:t>the</a:t>
-            </a:r>
-            <a:r>
-              <a:rPr/>
-              <a:t> </a:t>
-            </a:r>
-            <a:r>
-              <a:rPr/>
-              <a:t>green</a:t>
-            </a:r>
-            <a:r>
-              <a:rPr/>
-              <a:t> </a:t>
-            </a:r>
-            <a:r>
-              <a:rPr/>
-              <a:t>line</a:t>
-            </a:r>
-            <a:r>
-              <a:rPr/>
-              <a:t> </a:t>
-            </a:r>
-            <a:r>
-              <a:rPr/>
-              <a:t>of</a:t>
-            </a:r>
-            <a:r>
-              <a:rPr/>
-              <a:t> </a:t>
-            </a:r>
-            <a:r>
-              <a:rPr/>
-              <a:t>Baker.</a:t>
-            </a:r>
-            <a:r>
-              <a:rPr/>
-              <a:t> </a:t>
-            </a:r>
-            <a:r>
-              <a:rPr/>
-              <a:t>Notice</a:t>
-            </a:r>
-            <a:r>
-              <a:rPr/>
-              <a:t> </a:t>
-            </a:r>
-            <a:r>
-              <a:rPr/>
-              <a:t>further</a:t>
-            </a:r>
-            <a:r>
-              <a:rPr/>
-              <a:t> </a:t>
-            </a:r>
-            <a:r>
-              <a:rPr/>
-              <a:t>that</a:t>
-            </a:r>
-            <a:r>
-              <a:rPr/>
-              <a:t> </a:t>
-            </a:r>
-            <a:r>
-              <a:rPr/>
-              <a:t>the</a:t>
-            </a:r>
-            <a:r>
-              <a:rPr/>
-              <a:t> </a:t>
-            </a:r>
-            <a:r>
-              <a:rPr/>
-              <a:t>labels</a:t>
-            </a:r>
-            <a:r>
-              <a:rPr/>
-              <a:t> </a:t>
-            </a:r>
-            <a:r>
-              <a:rPr/>
-              <a:t>have</a:t>
-            </a:r>
-            <a:r>
-              <a:rPr/>
-              <a:t> </a:t>
-            </a:r>
-            <a:r>
-              <a:rPr/>
-              <a:t>a</a:t>
-            </a:r>
-            <a:r>
-              <a:rPr/>
-              <a:t> </a:t>
-            </a:r>
-            <a:r>
-              <a:rPr/>
-              <a:t>slope</a:t>
-            </a:r>
-            <a:r>
-              <a:rPr/>
-              <a:t> </a:t>
-            </a:r>
-            <a:r>
-              <a:rPr/>
-              <a:t>that</a:t>
-            </a:r>
-            <a:r>
-              <a:rPr/>
-              <a:t> </a:t>
-            </a:r>
-            <a:r>
-              <a:rPr/>
-              <a:t>roughly</a:t>
-            </a:r>
-            <a:r>
-              <a:rPr/>
-              <a:t> </a:t>
-            </a:r>
-            <a:r>
-              <a:rPr/>
-              <a:t>matches</a:t>
-            </a:r>
-            <a:r>
-              <a:rPr/>
-              <a:t> </a:t>
-            </a:r>
-            <a:r>
-              <a:rPr/>
-              <a:t>the</a:t>
-            </a:r>
-            <a:r>
-              <a:rPr/>
-              <a:t> </a:t>
-            </a:r>
-            <a:r>
-              <a:rPr/>
-              <a:t>lines</a:t>
-            </a:r>
-            <a:r>
-              <a:rPr/>
-              <a:t> </a:t>
-            </a:r>
-            <a:r>
-              <a:rPr/>
-              <a:t>they</a:t>
-            </a:r>
-            <a:r>
-              <a:rPr/>
-              <a:t> </a:t>
-            </a:r>
-            <a:r>
-              <a:rPr/>
-              <a:t>are</a:t>
-            </a:r>
-            <a:r>
-              <a:rPr/>
-              <a:t> </a:t>
-            </a:r>
-            <a:r>
-              <a:rPr/>
-              <a:t>attached</a:t>
-            </a:r>
-            <a:r>
-              <a:rPr/>
-              <a:t> </a:t>
-            </a:r>
-            <a:r>
-              <a:rPr/>
-              <a:t>to.</a:t>
-            </a:r>
-            <a:r>
-              <a:rPr/>
-              <a:t> </a:t>
-            </a:r>
-            <a:r>
-              <a:rPr/>
-              <a:t>This</a:t>
-            </a:r>
-            <a:r>
-              <a:rPr/>
-              <a:t> </a:t>
-            </a:r>
-            <a:r>
-              <a:rPr/>
-              <a:t>exploits</a:t>
-            </a:r>
-            <a:r>
-              <a:rPr/>
-              <a:t> </a:t>
-            </a:r>
-            <a:r>
-              <a:rPr/>
-              <a:t>the</a:t>
-            </a:r>
-            <a:r>
-              <a:rPr/>
-              <a:t> </a:t>
-            </a:r>
-            <a:r>
-              <a:rPr/>
-              <a:t>Gestalt</a:t>
-            </a:r>
-            <a:r>
-              <a:rPr/>
-              <a:t> </a:t>
-            </a:r>
-            <a:r>
-              <a:rPr/>
-              <a:t>principle</a:t>
-            </a:r>
-            <a:r>
-              <a:rPr/>
-              <a:t> </a:t>
-            </a:r>
-            <a:r>
-              <a:rPr/>
-              <a:t>of</a:t>
-            </a:r>
-            <a:r>
-              <a:rPr/>
-              <a:t> </a:t>
-            </a:r>
-            <a:r>
-              <a:rPr/>
-              <a:t>common</a:t>
-            </a:r>
-            <a:r>
-              <a:rPr/>
-              <a:t> </a:t>
-            </a:r>
-            <a:r>
-              <a:rPr/>
-              <a:t>fate.</a:t>
+              <a:t>principles.</a:t>
             </a:r>
           </a:p>
         </p:txBody>
@@ -4776,7 +4770,7 @@
           <a:p>
             <a:fld id="{18BDFEC3-8487-43E8-A154-7C12CBC1FFF2}" type="slidenum">
               <a:rPr lang="en-US"/>
-              <a:t>15</a:t>
+              <a:t>14</a:t>
             </a:fld>
             <a:endParaRPr lang="en-US"/>
           </a:p>
@@ -9183,7 +9177,7 @@
           <p:nvPr/>
         </p:nvPicPr>
         <p:blipFill>
-          <a:blip r:embed="rId2"/>
+          <a:blip r:embed="rId3"/>
           <a:stretch>
             <a:fillRect/>
           </a:stretch>

</xml_diff>